<commit_message>
löschen von Marzia datei mohahaha *hässliche lache*
</commit_message>
<xml_diff>
--- a/K-means clustering.pptx
+++ b/K-means clustering.pptx
@@ -3,19 +3,21 @@
 <p:presentation xmlns:a="http://schemas.openxmlformats.org/drawingml/2006/main" xmlns:r="http://schemas.openxmlformats.org/officeDocument/2006/relationships" xmlns:p="http://schemas.openxmlformats.org/presentationml/2006/main" saveSubsetFonts="1">
   <p:sldMasterIdLst>
     <p:sldMasterId id="2147483648" r:id="rId1"/>
+    <p:sldMasterId id="2147483660" r:id="rId2"/>
   </p:sldMasterIdLst>
   <p:notesMasterIdLst>
-    <p:notesMasterId r:id="rId10"/>
+    <p:notesMasterId r:id="rId12"/>
   </p:notesMasterIdLst>
   <p:sldIdLst>
-    <p:sldId id="256" r:id="rId2"/>
-    <p:sldId id="271" r:id="rId3"/>
-    <p:sldId id="258" r:id="rId4"/>
-    <p:sldId id="266" r:id="rId5"/>
-    <p:sldId id="267" r:id="rId6"/>
-    <p:sldId id="257" r:id="rId7"/>
-    <p:sldId id="269" r:id="rId8"/>
-    <p:sldId id="270" r:id="rId9"/>
+    <p:sldId id="256" r:id="rId3"/>
+    <p:sldId id="272" r:id="rId4"/>
+    <p:sldId id="271" r:id="rId5"/>
+    <p:sldId id="258" r:id="rId6"/>
+    <p:sldId id="266" r:id="rId7"/>
+    <p:sldId id="267" r:id="rId8"/>
+    <p:sldId id="257" r:id="rId9"/>
+    <p:sldId id="269" r:id="rId10"/>
+    <p:sldId id="270" r:id="rId11"/>
   </p:sldIdLst>
   <p:sldSz cx="12192000" cy="6858000"/>
   <p:notesSz cx="6858000" cy="9144000"/>
@@ -1109,6 +1111,765 @@
 </p:sldLayout>
 </file>
 
+<file path=ppt/slideLayouts/slideLayout12.xml><?xml version="1.0" encoding="utf-8"?>
+<p:sldLayout xmlns:a="http://schemas.openxmlformats.org/drawingml/2006/main" xmlns:r="http://schemas.openxmlformats.org/officeDocument/2006/relationships" xmlns:p="http://schemas.openxmlformats.org/presentationml/2006/main" type="blank" preserve="1">
+  <p:cSld name="Blank Slide">
+    <p:spTree>
+      <p:nvGrpSpPr>
+        <p:cNvPr id="1" name=""/>
+        <p:cNvGrpSpPr/>
+        <p:nvPr/>
+      </p:nvGrpSpPr>
+      <p:grpSpPr>
+        <a:xfrm>
+          <a:off x="0" y="0"/>
+          <a:ext cx="0" cy="0"/>
+          <a:chOff x="0" y="0"/>
+          <a:chExt cx="0" cy="0"/>
+        </a:xfrm>
+      </p:grpSpPr>
+    </p:spTree>
+    <p:extLst>
+      <p:ext uri="{BB962C8B-B14F-4D97-AF65-F5344CB8AC3E}">
+        <p14:creationId xmlns:p14="http://schemas.microsoft.com/office/powerpoint/2010/main" val="1346743979"/>
+      </p:ext>
+    </p:extLst>
+  </p:cSld>
+  <p:clrMapOvr>
+    <a:masterClrMapping/>
+  </p:clrMapOvr>
+</p:sldLayout>
+</file>
+
+<file path=ppt/slideLayouts/slideLayout13.xml><?xml version="1.0" encoding="utf-8"?>
+<p:sldLayout xmlns:a="http://schemas.openxmlformats.org/drawingml/2006/main" xmlns:r="http://schemas.openxmlformats.org/officeDocument/2006/relationships" xmlns:p="http://schemas.openxmlformats.org/presentationml/2006/main" type="tx" preserve="1">
+  <p:cSld name="Title Slide">
+    <p:spTree>
+      <p:nvGrpSpPr>
+        <p:cNvPr id="1" name=""/>
+        <p:cNvGrpSpPr/>
+        <p:nvPr/>
+      </p:nvGrpSpPr>
+      <p:grpSpPr>
+        <a:xfrm>
+          <a:off x="0" y="0"/>
+          <a:ext cx="0" cy="0"/>
+          <a:chOff x="0" y="0"/>
+          <a:chExt cx="0" cy="0"/>
+        </a:xfrm>
+      </p:grpSpPr>
+      <p:sp>
+        <p:nvSpPr>
+          <p:cNvPr id="40" name="PlaceHolder 1"/>
+          <p:cNvSpPr>
+            <a:spLocks noGrp="1"/>
+          </p:cNvSpPr>
+          <p:nvPr>
+            <p:ph type="title"/>
+          </p:nvPr>
+        </p:nvSpPr>
+        <p:spPr>
+          <a:xfrm>
+            <a:off x="609480" y="273600"/>
+            <a:ext cx="10972440" cy="1144800"/>
+          </a:xfrm>
+          <a:prstGeom prst="rect">
+            <a:avLst/>
+          </a:prstGeom>
+        </p:spPr>
+        <p:txBody>
+          <a:bodyPr lIns="0" tIns="0" rIns="0" bIns="0" anchor="ctr"/>
+          <a:lstStyle/>
+          <a:p>
+            <a:pPr algn="ctr"/>
+            <a:endParaRPr lang="de-DE" sz="4400" b="0" strike="noStrike" spc="-1">
+              <a:latin typeface="Arial"/>
+            </a:endParaRPr>
+          </a:p>
+        </p:txBody>
+      </p:sp>
+      <p:sp>
+        <p:nvSpPr>
+          <p:cNvPr id="41" name="PlaceHolder 2"/>
+          <p:cNvSpPr>
+            <a:spLocks noGrp="1"/>
+          </p:cNvSpPr>
+          <p:nvPr>
+            <p:ph type="subTitle"/>
+          </p:nvPr>
+        </p:nvSpPr>
+        <p:spPr>
+          <a:xfrm>
+            <a:off x="609480" y="1604520"/>
+            <a:ext cx="10972440" cy="3977280"/>
+          </a:xfrm>
+          <a:prstGeom prst="rect">
+            <a:avLst/>
+          </a:prstGeom>
+        </p:spPr>
+        <p:txBody>
+          <a:bodyPr lIns="0" tIns="0" rIns="0" bIns="0" anchor="ctr"/>
+          <a:lstStyle/>
+          <a:p>
+            <a:pPr algn="ctr"/>
+            <a:endParaRPr lang="de-DE" sz="3200" b="0" strike="noStrike" spc="-1">
+              <a:latin typeface="Arial"/>
+            </a:endParaRPr>
+          </a:p>
+        </p:txBody>
+      </p:sp>
+    </p:spTree>
+    <p:extLst>
+      <p:ext uri="{BB962C8B-B14F-4D97-AF65-F5344CB8AC3E}">
+        <p14:creationId xmlns:p14="http://schemas.microsoft.com/office/powerpoint/2010/main" val="763447451"/>
+      </p:ext>
+    </p:extLst>
+  </p:cSld>
+  <p:clrMapOvr>
+    <a:masterClrMapping/>
+  </p:clrMapOvr>
+</p:sldLayout>
+</file>
+
+<file path=ppt/slideLayouts/slideLayout14.xml><?xml version="1.0" encoding="utf-8"?>
+<p:sldLayout xmlns:a="http://schemas.openxmlformats.org/drawingml/2006/main" xmlns:r="http://schemas.openxmlformats.org/officeDocument/2006/relationships" xmlns:p="http://schemas.openxmlformats.org/presentationml/2006/main" type="obj" preserve="1">
+  <p:cSld name="Title, Content">
+    <p:spTree>
+      <p:nvGrpSpPr>
+        <p:cNvPr id="1" name=""/>
+        <p:cNvGrpSpPr/>
+        <p:nvPr/>
+      </p:nvGrpSpPr>
+      <p:grpSpPr>
+        <a:xfrm>
+          <a:off x="0" y="0"/>
+          <a:ext cx="0" cy="0"/>
+          <a:chOff x="0" y="0"/>
+          <a:chExt cx="0" cy="0"/>
+        </a:xfrm>
+      </p:grpSpPr>
+      <p:sp>
+        <p:nvSpPr>
+          <p:cNvPr id="42" name="PlaceHolder 1"/>
+          <p:cNvSpPr>
+            <a:spLocks noGrp="1"/>
+          </p:cNvSpPr>
+          <p:nvPr>
+            <p:ph type="title"/>
+          </p:nvPr>
+        </p:nvSpPr>
+        <p:spPr>
+          <a:xfrm>
+            <a:off x="609480" y="273600"/>
+            <a:ext cx="10972440" cy="1144800"/>
+          </a:xfrm>
+          <a:prstGeom prst="rect">
+            <a:avLst/>
+          </a:prstGeom>
+        </p:spPr>
+        <p:txBody>
+          <a:bodyPr lIns="0" tIns="0" rIns="0" bIns="0" anchor="ctr"/>
+          <a:lstStyle/>
+          <a:p>
+            <a:pPr algn="ctr"/>
+            <a:endParaRPr lang="de-DE" sz="4400" b="0" strike="noStrike" spc="-1">
+              <a:latin typeface="Arial"/>
+            </a:endParaRPr>
+          </a:p>
+        </p:txBody>
+      </p:sp>
+      <p:sp>
+        <p:nvSpPr>
+          <p:cNvPr id="43" name="PlaceHolder 2"/>
+          <p:cNvSpPr>
+            <a:spLocks noGrp="1"/>
+          </p:cNvSpPr>
+          <p:nvPr>
+            <p:ph type="body"/>
+          </p:nvPr>
+        </p:nvSpPr>
+        <p:spPr>
+          <a:xfrm>
+            <a:off x="609480" y="1604520"/>
+            <a:ext cx="10972440" cy="3977280"/>
+          </a:xfrm>
+          <a:prstGeom prst="rect">
+            <a:avLst/>
+          </a:prstGeom>
+        </p:spPr>
+        <p:txBody>
+          <a:bodyPr lIns="0" tIns="0" rIns="0" bIns="0">
+            <a:normAutofit/>
+          </a:bodyPr>
+          <a:lstStyle/>
+          <a:p>
+            <a:endParaRPr lang="de-DE" sz="3200" b="0" strike="noStrike" spc="-1">
+              <a:latin typeface="Arial"/>
+            </a:endParaRPr>
+          </a:p>
+        </p:txBody>
+      </p:sp>
+    </p:spTree>
+    <p:extLst>
+      <p:ext uri="{BB962C8B-B14F-4D97-AF65-F5344CB8AC3E}">
+        <p14:creationId xmlns:p14="http://schemas.microsoft.com/office/powerpoint/2010/main" val="296130807"/>
+      </p:ext>
+    </p:extLst>
+  </p:cSld>
+  <p:clrMapOvr>
+    <a:masterClrMapping/>
+  </p:clrMapOvr>
+</p:sldLayout>
+</file>
+
+<file path=ppt/slideLayouts/slideLayout15.xml><?xml version="1.0" encoding="utf-8"?>
+<p:sldLayout xmlns:a="http://schemas.openxmlformats.org/drawingml/2006/main" xmlns:r="http://schemas.openxmlformats.org/officeDocument/2006/relationships" xmlns:p="http://schemas.openxmlformats.org/presentationml/2006/main" type="twoObj" preserve="1">
+  <p:cSld name="Title, 2 Content">
+    <p:spTree>
+      <p:nvGrpSpPr>
+        <p:cNvPr id="1" name=""/>
+        <p:cNvGrpSpPr/>
+        <p:nvPr/>
+      </p:nvGrpSpPr>
+      <p:grpSpPr>
+        <a:xfrm>
+          <a:off x="0" y="0"/>
+          <a:ext cx="0" cy="0"/>
+          <a:chOff x="0" y="0"/>
+          <a:chExt cx="0" cy="0"/>
+        </a:xfrm>
+      </p:grpSpPr>
+      <p:sp>
+        <p:nvSpPr>
+          <p:cNvPr id="44" name="PlaceHolder 1"/>
+          <p:cNvSpPr>
+            <a:spLocks noGrp="1"/>
+          </p:cNvSpPr>
+          <p:nvPr>
+            <p:ph type="title"/>
+          </p:nvPr>
+        </p:nvSpPr>
+        <p:spPr>
+          <a:xfrm>
+            <a:off x="609480" y="273600"/>
+            <a:ext cx="10972440" cy="1144800"/>
+          </a:xfrm>
+          <a:prstGeom prst="rect">
+            <a:avLst/>
+          </a:prstGeom>
+        </p:spPr>
+        <p:txBody>
+          <a:bodyPr lIns="0" tIns="0" rIns="0" bIns="0" anchor="ctr"/>
+          <a:lstStyle/>
+          <a:p>
+            <a:pPr algn="ctr"/>
+            <a:endParaRPr lang="de-DE" sz="4400" b="0" strike="noStrike" spc="-1">
+              <a:latin typeface="Arial"/>
+            </a:endParaRPr>
+          </a:p>
+        </p:txBody>
+      </p:sp>
+      <p:sp>
+        <p:nvSpPr>
+          <p:cNvPr id="45" name="PlaceHolder 2"/>
+          <p:cNvSpPr>
+            <a:spLocks noGrp="1"/>
+          </p:cNvSpPr>
+          <p:nvPr>
+            <p:ph type="body"/>
+          </p:nvPr>
+        </p:nvSpPr>
+        <p:spPr>
+          <a:xfrm>
+            <a:off x="609480" y="1604520"/>
+            <a:ext cx="5354280" cy="3977280"/>
+          </a:xfrm>
+          <a:prstGeom prst="rect">
+            <a:avLst/>
+          </a:prstGeom>
+        </p:spPr>
+        <p:txBody>
+          <a:bodyPr lIns="0" tIns="0" rIns="0" bIns="0">
+            <a:normAutofit/>
+          </a:bodyPr>
+          <a:lstStyle/>
+          <a:p>
+            <a:endParaRPr lang="de-DE" sz="3200" b="0" strike="noStrike" spc="-1">
+              <a:latin typeface="Arial"/>
+            </a:endParaRPr>
+          </a:p>
+        </p:txBody>
+      </p:sp>
+      <p:sp>
+        <p:nvSpPr>
+          <p:cNvPr id="46" name="PlaceHolder 3"/>
+          <p:cNvSpPr>
+            <a:spLocks noGrp="1"/>
+          </p:cNvSpPr>
+          <p:nvPr>
+            <p:ph type="body"/>
+          </p:nvPr>
+        </p:nvSpPr>
+        <p:spPr>
+          <a:xfrm>
+            <a:off x="6231960" y="1604520"/>
+            <a:ext cx="5354280" cy="3977280"/>
+          </a:xfrm>
+          <a:prstGeom prst="rect">
+            <a:avLst/>
+          </a:prstGeom>
+        </p:spPr>
+        <p:txBody>
+          <a:bodyPr lIns="0" tIns="0" rIns="0" bIns="0">
+            <a:normAutofit/>
+          </a:bodyPr>
+          <a:lstStyle/>
+          <a:p>
+            <a:endParaRPr lang="de-DE" sz="3200" b="0" strike="noStrike" spc="-1">
+              <a:latin typeface="Arial"/>
+            </a:endParaRPr>
+          </a:p>
+        </p:txBody>
+      </p:sp>
+    </p:spTree>
+    <p:extLst>
+      <p:ext uri="{BB962C8B-B14F-4D97-AF65-F5344CB8AC3E}">
+        <p14:creationId xmlns:p14="http://schemas.microsoft.com/office/powerpoint/2010/main" val="1271781075"/>
+      </p:ext>
+    </p:extLst>
+  </p:cSld>
+  <p:clrMapOvr>
+    <a:masterClrMapping/>
+  </p:clrMapOvr>
+</p:sldLayout>
+</file>
+
+<file path=ppt/slideLayouts/slideLayout16.xml><?xml version="1.0" encoding="utf-8"?>
+<p:sldLayout xmlns:a="http://schemas.openxmlformats.org/drawingml/2006/main" xmlns:r="http://schemas.openxmlformats.org/officeDocument/2006/relationships" xmlns:p="http://schemas.openxmlformats.org/presentationml/2006/main" type="titleOnly" preserve="1">
+  <p:cSld name="Title Only">
+    <p:spTree>
+      <p:nvGrpSpPr>
+        <p:cNvPr id="1" name=""/>
+        <p:cNvGrpSpPr/>
+        <p:nvPr/>
+      </p:nvGrpSpPr>
+      <p:grpSpPr>
+        <a:xfrm>
+          <a:off x="0" y="0"/>
+          <a:ext cx="0" cy="0"/>
+          <a:chOff x="0" y="0"/>
+          <a:chExt cx="0" cy="0"/>
+        </a:xfrm>
+      </p:grpSpPr>
+      <p:sp>
+        <p:nvSpPr>
+          <p:cNvPr id="47" name="PlaceHolder 1"/>
+          <p:cNvSpPr>
+            <a:spLocks noGrp="1"/>
+          </p:cNvSpPr>
+          <p:nvPr>
+            <p:ph type="title"/>
+          </p:nvPr>
+        </p:nvSpPr>
+        <p:spPr>
+          <a:xfrm>
+            <a:off x="609480" y="273600"/>
+            <a:ext cx="10972440" cy="1144800"/>
+          </a:xfrm>
+          <a:prstGeom prst="rect">
+            <a:avLst/>
+          </a:prstGeom>
+        </p:spPr>
+        <p:txBody>
+          <a:bodyPr lIns="0" tIns="0" rIns="0" bIns="0" anchor="ctr"/>
+          <a:lstStyle/>
+          <a:p>
+            <a:pPr algn="ctr"/>
+            <a:endParaRPr lang="de-DE" sz="4400" b="0" strike="noStrike" spc="-1">
+              <a:latin typeface="Arial"/>
+            </a:endParaRPr>
+          </a:p>
+        </p:txBody>
+      </p:sp>
+    </p:spTree>
+    <p:extLst>
+      <p:ext uri="{BB962C8B-B14F-4D97-AF65-F5344CB8AC3E}">
+        <p14:creationId xmlns:p14="http://schemas.microsoft.com/office/powerpoint/2010/main" val="376417343"/>
+      </p:ext>
+    </p:extLst>
+  </p:cSld>
+  <p:clrMapOvr>
+    <a:masterClrMapping/>
+  </p:clrMapOvr>
+</p:sldLayout>
+</file>
+
+<file path=ppt/slideLayouts/slideLayout17.xml><?xml version="1.0" encoding="utf-8"?>
+<p:sldLayout xmlns:a="http://schemas.openxmlformats.org/drawingml/2006/main" xmlns:r="http://schemas.openxmlformats.org/officeDocument/2006/relationships" xmlns:p="http://schemas.openxmlformats.org/presentationml/2006/main" type="objOnly" preserve="1">
+  <p:cSld name="Centered Text">
+    <p:spTree>
+      <p:nvGrpSpPr>
+        <p:cNvPr id="1" name=""/>
+        <p:cNvGrpSpPr/>
+        <p:nvPr/>
+      </p:nvGrpSpPr>
+      <p:grpSpPr>
+        <a:xfrm>
+          <a:off x="0" y="0"/>
+          <a:ext cx="0" cy="0"/>
+          <a:chOff x="0" y="0"/>
+          <a:chExt cx="0" cy="0"/>
+        </a:xfrm>
+      </p:grpSpPr>
+      <p:sp>
+        <p:nvSpPr>
+          <p:cNvPr id="48" name="PlaceHolder 1"/>
+          <p:cNvSpPr>
+            <a:spLocks noGrp="1"/>
+          </p:cNvSpPr>
+          <p:nvPr>
+            <p:ph type="subTitle"/>
+          </p:nvPr>
+        </p:nvSpPr>
+        <p:spPr>
+          <a:xfrm>
+            <a:off x="609480" y="273600"/>
+            <a:ext cx="10972440" cy="5307840"/>
+          </a:xfrm>
+          <a:prstGeom prst="rect">
+            <a:avLst/>
+          </a:prstGeom>
+        </p:spPr>
+        <p:txBody>
+          <a:bodyPr lIns="0" tIns="0" rIns="0" bIns="0" anchor="ctr"/>
+          <a:lstStyle/>
+          <a:p>
+            <a:pPr algn="ctr"/>
+            <a:endParaRPr lang="de-DE" sz="3200" b="0" strike="noStrike" spc="-1">
+              <a:latin typeface="Arial"/>
+            </a:endParaRPr>
+          </a:p>
+        </p:txBody>
+      </p:sp>
+    </p:spTree>
+    <p:extLst>
+      <p:ext uri="{BB962C8B-B14F-4D97-AF65-F5344CB8AC3E}">
+        <p14:creationId xmlns:p14="http://schemas.microsoft.com/office/powerpoint/2010/main" val="1955175836"/>
+      </p:ext>
+    </p:extLst>
+  </p:cSld>
+  <p:clrMapOvr>
+    <a:masterClrMapping/>
+  </p:clrMapOvr>
+</p:sldLayout>
+</file>
+
+<file path=ppt/slideLayouts/slideLayout18.xml><?xml version="1.0" encoding="utf-8"?>
+<p:sldLayout xmlns:a="http://schemas.openxmlformats.org/drawingml/2006/main" xmlns:r="http://schemas.openxmlformats.org/officeDocument/2006/relationships" xmlns:p="http://schemas.openxmlformats.org/presentationml/2006/main" type="twoObjAndObj" preserve="1">
+  <p:cSld name="Title, 2 Content and Content">
+    <p:spTree>
+      <p:nvGrpSpPr>
+        <p:cNvPr id="1" name=""/>
+        <p:cNvGrpSpPr/>
+        <p:nvPr/>
+      </p:nvGrpSpPr>
+      <p:grpSpPr>
+        <a:xfrm>
+          <a:off x="0" y="0"/>
+          <a:ext cx="0" cy="0"/>
+          <a:chOff x="0" y="0"/>
+          <a:chExt cx="0" cy="0"/>
+        </a:xfrm>
+      </p:grpSpPr>
+      <p:sp>
+        <p:nvSpPr>
+          <p:cNvPr id="49" name="PlaceHolder 1"/>
+          <p:cNvSpPr>
+            <a:spLocks noGrp="1"/>
+          </p:cNvSpPr>
+          <p:nvPr>
+            <p:ph type="title"/>
+          </p:nvPr>
+        </p:nvSpPr>
+        <p:spPr>
+          <a:xfrm>
+            <a:off x="609480" y="273600"/>
+            <a:ext cx="10972440" cy="1144800"/>
+          </a:xfrm>
+          <a:prstGeom prst="rect">
+            <a:avLst/>
+          </a:prstGeom>
+        </p:spPr>
+        <p:txBody>
+          <a:bodyPr lIns="0" tIns="0" rIns="0" bIns="0" anchor="ctr"/>
+          <a:lstStyle/>
+          <a:p>
+            <a:pPr algn="ctr"/>
+            <a:endParaRPr lang="de-DE" sz="4400" b="0" strike="noStrike" spc="-1">
+              <a:latin typeface="Arial"/>
+            </a:endParaRPr>
+          </a:p>
+        </p:txBody>
+      </p:sp>
+      <p:sp>
+        <p:nvSpPr>
+          <p:cNvPr id="50" name="PlaceHolder 2"/>
+          <p:cNvSpPr>
+            <a:spLocks noGrp="1"/>
+          </p:cNvSpPr>
+          <p:nvPr>
+            <p:ph type="body"/>
+          </p:nvPr>
+        </p:nvSpPr>
+        <p:spPr>
+          <a:xfrm>
+            <a:off x="609480" y="1604520"/>
+            <a:ext cx="5354280" cy="1896840"/>
+          </a:xfrm>
+          <a:prstGeom prst="rect">
+            <a:avLst/>
+          </a:prstGeom>
+        </p:spPr>
+        <p:txBody>
+          <a:bodyPr lIns="0" tIns="0" rIns="0" bIns="0">
+            <a:normAutofit/>
+          </a:bodyPr>
+          <a:lstStyle/>
+          <a:p>
+            <a:endParaRPr lang="de-DE" sz="3200" b="0" strike="noStrike" spc="-1">
+              <a:latin typeface="Arial"/>
+            </a:endParaRPr>
+          </a:p>
+        </p:txBody>
+      </p:sp>
+      <p:sp>
+        <p:nvSpPr>
+          <p:cNvPr id="51" name="PlaceHolder 3"/>
+          <p:cNvSpPr>
+            <a:spLocks noGrp="1"/>
+          </p:cNvSpPr>
+          <p:nvPr>
+            <p:ph type="body"/>
+          </p:nvPr>
+        </p:nvSpPr>
+        <p:spPr>
+          <a:xfrm>
+            <a:off x="6231960" y="1604520"/>
+            <a:ext cx="5354280" cy="3977280"/>
+          </a:xfrm>
+          <a:prstGeom prst="rect">
+            <a:avLst/>
+          </a:prstGeom>
+        </p:spPr>
+        <p:txBody>
+          <a:bodyPr lIns="0" tIns="0" rIns="0" bIns="0">
+            <a:normAutofit/>
+          </a:bodyPr>
+          <a:lstStyle/>
+          <a:p>
+            <a:endParaRPr lang="de-DE" sz="3200" b="0" strike="noStrike" spc="-1">
+              <a:latin typeface="Arial"/>
+            </a:endParaRPr>
+          </a:p>
+        </p:txBody>
+      </p:sp>
+      <p:sp>
+        <p:nvSpPr>
+          <p:cNvPr id="52" name="PlaceHolder 4"/>
+          <p:cNvSpPr>
+            <a:spLocks noGrp="1"/>
+          </p:cNvSpPr>
+          <p:nvPr>
+            <p:ph type="body"/>
+          </p:nvPr>
+        </p:nvSpPr>
+        <p:spPr>
+          <a:xfrm>
+            <a:off x="609480" y="3682080"/>
+            <a:ext cx="5354280" cy="1896840"/>
+          </a:xfrm>
+          <a:prstGeom prst="rect">
+            <a:avLst/>
+          </a:prstGeom>
+        </p:spPr>
+        <p:txBody>
+          <a:bodyPr lIns="0" tIns="0" rIns="0" bIns="0">
+            <a:normAutofit/>
+          </a:bodyPr>
+          <a:lstStyle/>
+          <a:p>
+            <a:endParaRPr lang="de-DE" sz="3200" b="0" strike="noStrike" spc="-1">
+              <a:latin typeface="Arial"/>
+            </a:endParaRPr>
+          </a:p>
+        </p:txBody>
+      </p:sp>
+    </p:spTree>
+    <p:extLst>
+      <p:ext uri="{BB962C8B-B14F-4D97-AF65-F5344CB8AC3E}">
+        <p14:creationId xmlns:p14="http://schemas.microsoft.com/office/powerpoint/2010/main" val="1950346822"/>
+      </p:ext>
+    </p:extLst>
+  </p:cSld>
+  <p:clrMapOvr>
+    <a:masterClrMapping/>
+  </p:clrMapOvr>
+</p:sldLayout>
+</file>
+
+<file path=ppt/slideLayouts/slideLayout19.xml><?xml version="1.0" encoding="utf-8"?>
+<p:sldLayout xmlns:a="http://schemas.openxmlformats.org/drawingml/2006/main" xmlns:r="http://schemas.openxmlformats.org/officeDocument/2006/relationships" xmlns:p="http://schemas.openxmlformats.org/presentationml/2006/main" type="objAndTwoObj" preserve="1">
+  <p:cSld name="Title Content and 2 Content">
+    <p:spTree>
+      <p:nvGrpSpPr>
+        <p:cNvPr id="1" name=""/>
+        <p:cNvGrpSpPr/>
+        <p:nvPr/>
+      </p:nvGrpSpPr>
+      <p:grpSpPr>
+        <a:xfrm>
+          <a:off x="0" y="0"/>
+          <a:ext cx="0" cy="0"/>
+          <a:chOff x="0" y="0"/>
+          <a:chExt cx="0" cy="0"/>
+        </a:xfrm>
+      </p:grpSpPr>
+      <p:sp>
+        <p:nvSpPr>
+          <p:cNvPr id="53" name="PlaceHolder 1"/>
+          <p:cNvSpPr>
+            <a:spLocks noGrp="1"/>
+          </p:cNvSpPr>
+          <p:nvPr>
+            <p:ph type="title"/>
+          </p:nvPr>
+        </p:nvSpPr>
+        <p:spPr>
+          <a:xfrm>
+            <a:off x="609480" y="273600"/>
+            <a:ext cx="10972440" cy="1144800"/>
+          </a:xfrm>
+          <a:prstGeom prst="rect">
+            <a:avLst/>
+          </a:prstGeom>
+        </p:spPr>
+        <p:txBody>
+          <a:bodyPr lIns="0" tIns="0" rIns="0" bIns="0" anchor="ctr"/>
+          <a:lstStyle/>
+          <a:p>
+            <a:pPr algn="ctr"/>
+            <a:endParaRPr lang="de-DE" sz="4400" b="0" strike="noStrike" spc="-1">
+              <a:latin typeface="Arial"/>
+            </a:endParaRPr>
+          </a:p>
+        </p:txBody>
+      </p:sp>
+      <p:sp>
+        <p:nvSpPr>
+          <p:cNvPr id="54" name="PlaceHolder 2"/>
+          <p:cNvSpPr>
+            <a:spLocks noGrp="1"/>
+          </p:cNvSpPr>
+          <p:nvPr>
+            <p:ph type="body"/>
+          </p:nvPr>
+        </p:nvSpPr>
+        <p:spPr>
+          <a:xfrm>
+            <a:off x="609480" y="1604520"/>
+            <a:ext cx="5354280" cy="3977280"/>
+          </a:xfrm>
+          <a:prstGeom prst="rect">
+            <a:avLst/>
+          </a:prstGeom>
+        </p:spPr>
+        <p:txBody>
+          <a:bodyPr lIns="0" tIns="0" rIns="0" bIns="0">
+            <a:normAutofit/>
+          </a:bodyPr>
+          <a:lstStyle/>
+          <a:p>
+            <a:endParaRPr lang="de-DE" sz="3200" b="0" strike="noStrike" spc="-1">
+              <a:latin typeface="Arial"/>
+            </a:endParaRPr>
+          </a:p>
+        </p:txBody>
+      </p:sp>
+      <p:sp>
+        <p:nvSpPr>
+          <p:cNvPr id="55" name="PlaceHolder 3"/>
+          <p:cNvSpPr>
+            <a:spLocks noGrp="1"/>
+          </p:cNvSpPr>
+          <p:nvPr>
+            <p:ph type="body"/>
+          </p:nvPr>
+        </p:nvSpPr>
+        <p:spPr>
+          <a:xfrm>
+            <a:off x="6231960" y="1604520"/>
+            <a:ext cx="5354280" cy="1896840"/>
+          </a:xfrm>
+          <a:prstGeom prst="rect">
+            <a:avLst/>
+          </a:prstGeom>
+        </p:spPr>
+        <p:txBody>
+          <a:bodyPr lIns="0" tIns="0" rIns="0" bIns="0">
+            <a:normAutofit/>
+          </a:bodyPr>
+          <a:lstStyle/>
+          <a:p>
+            <a:endParaRPr lang="de-DE" sz="3200" b="0" strike="noStrike" spc="-1">
+              <a:latin typeface="Arial"/>
+            </a:endParaRPr>
+          </a:p>
+        </p:txBody>
+      </p:sp>
+      <p:sp>
+        <p:nvSpPr>
+          <p:cNvPr id="56" name="PlaceHolder 4"/>
+          <p:cNvSpPr>
+            <a:spLocks noGrp="1"/>
+          </p:cNvSpPr>
+          <p:nvPr>
+            <p:ph type="body"/>
+          </p:nvPr>
+        </p:nvSpPr>
+        <p:spPr>
+          <a:xfrm>
+            <a:off x="6231960" y="3682080"/>
+            <a:ext cx="5354280" cy="1896840"/>
+          </a:xfrm>
+          <a:prstGeom prst="rect">
+            <a:avLst/>
+          </a:prstGeom>
+        </p:spPr>
+        <p:txBody>
+          <a:bodyPr lIns="0" tIns="0" rIns="0" bIns="0">
+            <a:normAutofit/>
+          </a:bodyPr>
+          <a:lstStyle/>
+          <a:p>
+            <a:endParaRPr lang="de-DE" sz="3200" b="0" strike="noStrike" spc="-1">
+              <a:latin typeface="Arial"/>
+            </a:endParaRPr>
+          </a:p>
+        </p:txBody>
+      </p:sp>
+    </p:spTree>
+    <p:extLst>
+      <p:ext uri="{BB962C8B-B14F-4D97-AF65-F5344CB8AC3E}">
+        <p14:creationId xmlns:p14="http://schemas.microsoft.com/office/powerpoint/2010/main" val="2702387711"/>
+      </p:ext>
+    </p:extLst>
+  </p:cSld>
+  <p:clrMapOvr>
+    <a:masterClrMapping/>
+  </p:clrMapOvr>
+</p:sldLayout>
+</file>
+
 <file path=ppt/slideLayouts/slideLayout2.xml><?xml version="1.0" encoding="utf-8"?>
 <p:sldLayout xmlns:a="http://schemas.openxmlformats.org/drawingml/2006/main" xmlns:r="http://schemas.openxmlformats.org/officeDocument/2006/relationships" xmlns:p="http://schemas.openxmlformats.org/presentationml/2006/main" type="obj" preserve="1">
   <p:cSld name="Titel und Inhalt">
@@ -1298,6 +2059,711 @@
     <p:extLst>
       <p:ext uri="{BB962C8B-B14F-4D97-AF65-F5344CB8AC3E}">
         <p14:creationId xmlns:p14="http://schemas.microsoft.com/office/powerpoint/2010/main" val="920859098"/>
+      </p:ext>
+    </p:extLst>
+  </p:cSld>
+  <p:clrMapOvr>
+    <a:masterClrMapping/>
+  </p:clrMapOvr>
+</p:sldLayout>
+</file>
+
+<file path=ppt/slideLayouts/slideLayout20.xml><?xml version="1.0" encoding="utf-8"?>
+<p:sldLayout xmlns:a="http://schemas.openxmlformats.org/drawingml/2006/main" xmlns:r="http://schemas.openxmlformats.org/officeDocument/2006/relationships" xmlns:p="http://schemas.openxmlformats.org/presentationml/2006/main" type="twoObjOverTx" preserve="1">
+  <p:cSld name="Title, 2 Content over Content">
+    <p:spTree>
+      <p:nvGrpSpPr>
+        <p:cNvPr id="1" name=""/>
+        <p:cNvGrpSpPr/>
+        <p:nvPr/>
+      </p:nvGrpSpPr>
+      <p:grpSpPr>
+        <a:xfrm>
+          <a:off x="0" y="0"/>
+          <a:ext cx="0" cy="0"/>
+          <a:chOff x="0" y="0"/>
+          <a:chExt cx="0" cy="0"/>
+        </a:xfrm>
+      </p:grpSpPr>
+      <p:sp>
+        <p:nvSpPr>
+          <p:cNvPr id="57" name="PlaceHolder 1"/>
+          <p:cNvSpPr>
+            <a:spLocks noGrp="1"/>
+          </p:cNvSpPr>
+          <p:nvPr>
+            <p:ph type="title"/>
+          </p:nvPr>
+        </p:nvSpPr>
+        <p:spPr>
+          <a:xfrm>
+            <a:off x="609480" y="273600"/>
+            <a:ext cx="10972440" cy="1144800"/>
+          </a:xfrm>
+          <a:prstGeom prst="rect">
+            <a:avLst/>
+          </a:prstGeom>
+        </p:spPr>
+        <p:txBody>
+          <a:bodyPr lIns="0" tIns="0" rIns="0" bIns="0" anchor="ctr"/>
+          <a:lstStyle/>
+          <a:p>
+            <a:pPr algn="ctr"/>
+            <a:endParaRPr lang="de-DE" sz="4400" b="0" strike="noStrike" spc="-1">
+              <a:latin typeface="Arial"/>
+            </a:endParaRPr>
+          </a:p>
+        </p:txBody>
+      </p:sp>
+      <p:sp>
+        <p:nvSpPr>
+          <p:cNvPr id="58" name="PlaceHolder 2"/>
+          <p:cNvSpPr>
+            <a:spLocks noGrp="1"/>
+          </p:cNvSpPr>
+          <p:nvPr>
+            <p:ph type="body"/>
+          </p:nvPr>
+        </p:nvSpPr>
+        <p:spPr>
+          <a:xfrm>
+            <a:off x="609480" y="1604520"/>
+            <a:ext cx="5354280" cy="1896840"/>
+          </a:xfrm>
+          <a:prstGeom prst="rect">
+            <a:avLst/>
+          </a:prstGeom>
+        </p:spPr>
+        <p:txBody>
+          <a:bodyPr lIns="0" tIns="0" rIns="0" bIns="0">
+            <a:normAutofit/>
+          </a:bodyPr>
+          <a:lstStyle/>
+          <a:p>
+            <a:endParaRPr lang="de-DE" sz="3200" b="0" strike="noStrike" spc="-1">
+              <a:latin typeface="Arial"/>
+            </a:endParaRPr>
+          </a:p>
+        </p:txBody>
+      </p:sp>
+      <p:sp>
+        <p:nvSpPr>
+          <p:cNvPr id="59" name="PlaceHolder 3"/>
+          <p:cNvSpPr>
+            <a:spLocks noGrp="1"/>
+          </p:cNvSpPr>
+          <p:nvPr>
+            <p:ph type="body"/>
+          </p:nvPr>
+        </p:nvSpPr>
+        <p:spPr>
+          <a:xfrm>
+            <a:off x="6231960" y="1604520"/>
+            <a:ext cx="5354280" cy="1896840"/>
+          </a:xfrm>
+          <a:prstGeom prst="rect">
+            <a:avLst/>
+          </a:prstGeom>
+        </p:spPr>
+        <p:txBody>
+          <a:bodyPr lIns="0" tIns="0" rIns="0" bIns="0">
+            <a:normAutofit/>
+          </a:bodyPr>
+          <a:lstStyle/>
+          <a:p>
+            <a:endParaRPr lang="de-DE" sz="3200" b="0" strike="noStrike" spc="-1">
+              <a:latin typeface="Arial"/>
+            </a:endParaRPr>
+          </a:p>
+        </p:txBody>
+      </p:sp>
+      <p:sp>
+        <p:nvSpPr>
+          <p:cNvPr id="60" name="PlaceHolder 4"/>
+          <p:cNvSpPr>
+            <a:spLocks noGrp="1"/>
+          </p:cNvSpPr>
+          <p:nvPr>
+            <p:ph type="body"/>
+          </p:nvPr>
+        </p:nvSpPr>
+        <p:spPr>
+          <a:xfrm>
+            <a:off x="609480" y="3682080"/>
+            <a:ext cx="10972440" cy="1896840"/>
+          </a:xfrm>
+          <a:prstGeom prst="rect">
+            <a:avLst/>
+          </a:prstGeom>
+        </p:spPr>
+        <p:txBody>
+          <a:bodyPr lIns="0" tIns="0" rIns="0" bIns="0">
+            <a:normAutofit/>
+          </a:bodyPr>
+          <a:lstStyle/>
+          <a:p>
+            <a:endParaRPr lang="de-DE" sz="3200" b="0" strike="noStrike" spc="-1">
+              <a:latin typeface="Arial"/>
+            </a:endParaRPr>
+          </a:p>
+        </p:txBody>
+      </p:sp>
+    </p:spTree>
+    <p:extLst>
+      <p:ext uri="{BB962C8B-B14F-4D97-AF65-F5344CB8AC3E}">
+        <p14:creationId xmlns:p14="http://schemas.microsoft.com/office/powerpoint/2010/main" val="4098471979"/>
+      </p:ext>
+    </p:extLst>
+  </p:cSld>
+  <p:clrMapOvr>
+    <a:masterClrMapping/>
+  </p:clrMapOvr>
+</p:sldLayout>
+</file>
+
+<file path=ppt/slideLayouts/slideLayout21.xml><?xml version="1.0" encoding="utf-8"?>
+<p:sldLayout xmlns:a="http://schemas.openxmlformats.org/drawingml/2006/main" xmlns:r="http://schemas.openxmlformats.org/officeDocument/2006/relationships" xmlns:p="http://schemas.openxmlformats.org/presentationml/2006/main" type="objOverTx" preserve="1">
+  <p:cSld name="Title, Content over Content">
+    <p:spTree>
+      <p:nvGrpSpPr>
+        <p:cNvPr id="1" name=""/>
+        <p:cNvGrpSpPr/>
+        <p:nvPr/>
+      </p:nvGrpSpPr>
+      <p:grpSpPr>
+        <a:xfrm>
+          <a:off x="0" y="0"/>
+          <a:ext cx="0" cy="0"/>
+          <a:chOff x="0" y="0"/>
+          <a:chExt cx="0" cy="0"/>
+        </a:xfrm>
+      </p:grpSpPr>
+      <p:sp>
+        <p:nvSpPr>
+          <p:cNvPr id="61" name="PlaceHolder 1"/>
+          <p:cNvSpPr>
+            <a:spLocks noGrp="1"/>
+          </p:cNvSpPr>
+          <p:nvPr>
+            <p:ph type="title"/>
+          </p:nvPr>
+        </p:nvSpPr>
+        <p:spPr>
+          <a:xfrm>
+            <a:off x="609480" y="273600"/>
+            <a:ext cx="10972440" cy="1144800"/>
+          </a:xfrm>
+          <a:prstGeom prst="rect">
+            <a:avLst/>
+          </a:prstGeom>
+        </p:spPr>
+        <p:txBody>
+          <a:bodyPr lIns="0" tIns="0" rIns="0" bIns="0" anchor="ctr"/>
+          <a:lstStyle/>
+          <a:p>
+            <a:pPr algn="ctr"/>
+            <a:endParaRPr lang="de-DE" sz="4400" b="0" strike="noStrike" spc="-1">
+              <a:latin typeface="Arial"/>
+            </a:endParaRPr>
+          </a:p>
+        </p:txBody>
+      </p:sp>
+      <p:sp>
+        <p:nvSpPr>
+          <p:cNvPr id="62" name="PlaceHolder 2"/>
+          <p:cNvSpPr>
+            <a:spLocks noGrp="1"/>
+          </p:cNvSpPr>
+          <p:nvPr>
+            <p:ph type="body"/>
+          </p:nvPr>
+        </p:nvSpPr>
+        <p:spPr>
+          <a:xfrm>
+            <a:off x="609480" y="1604520"/>
+            <a:ext cx="10972440" cy="1896840"/>
+          </a:xfrm>
+          <a:prstGeom prst="rect">
+            <a:avLst/>
+          </a:prstGeom>
+        </p:spPr>
+        <p:txBody>
+          <a:bodyPr lIns="0" tIns="0" rIns="0" bIns="0">
+            <a:normAutofit/>
+          </a:bodyPr>
+          <a:lstStyle/>
+          <a:p>
+            <a:endParaRPr lang="de-DE" sz="3200" b="0" strike="noStrike" spc="-1">
+              <a:latin typeface="Arial"/>
+            </a:endParaRPr>
+          </a:p>
+        </p:txBody>
+      </p:sp>
+      <p:sp>
+        <p:nvSpPr>
+          <p:cNvPr id="63" name="PlaceHolder 3"/>
+          <p:cNvSpPr>
+            <a:spLocks noGrp="1"/>
+          </p:cNvSpPr>
+          <p:nvPr>
+            <p:ph type="body"/>
+          </p:nvPr>
+        </p:nvSpPr>
+        <p:spPr>
+          <a:xfrm>
+            <a:off x="609480" y="3682080"/>
+            <a:ext cx="10972440" cy="1896840"/>
+          </a:xfrm>
+          <a:prstGeom prst="rect">
+            <a:avLst/>
+          </a:prstGeom>
+        </p:spPr>
+        <p:txBody>
+          <a:bodyPr lIns="0" tIns="0" rIns="0" bIns="0">
+            <a:normAutofit/>
+          </a:bodyPr>
+          <a:lstStyle/>
+          <a:p>
+            <a:endParaRPr lang="de-DE" sz="3200" b="0" strike="noStrike" spc="-1">
+              <a:latin typeface="Arial"/>
+            </a:endParaRPr>
+          </a:p>
+        </p:txBody>
+      </p:sp>
+    </p:spTree>
+    <p:extLst>
+      <p:ext uri="{BB962C8B-B14F-4D97-AF65-F5344CB8AC3E}">
+        <p14:creationId xmlns:p14="http://schemas.microsoft.com/office/powerpoint/2010/main" val="358755781"/>
+      </p:ext>
+    </p:extLst>
+  </p:cSld>
+  <p:clrMapOvr>
+    <a:masterClrMapping/>
+  </p:clrMapOvr>
+</p:sldLayout>
+</file>
+
+<file path=ppt/slideLayouts/slideLayout22.xml><?xml version="1.0" encoding="utf-8"?>
+<p:sldLayout xmlns:a="http://schemas.openxmlformats.org/drawingml/2006/main" xmlns:r="http://schemas.openxmlformats.org/officeDocument/2006/relationships" xmlns:p="http://schemas.openxmlformats.org/presentationml/2006/main" type="fourObj" preserve="1">
+  <p:cSld name="Title, 4 Content">
+    <p:spTree>
+      <p:nvGrpSpPr>
+        <p:cNvPr id="1" name=""/>
+        <p:cNvGrpSpPr/>
+        <p:nvPr/>
+      </p:nvGrpSpPr>
+      <p:grpSpPr>
+        <a:xfrm>
+          <a:off x="0" y="0"/>
+          <a:ext cx="0" cy="0"/>
+          <a:chOff x="0" y="0"/>
+          <a:chExt cx="0" cy="0"/>
+        </a:xfrm>
+      </p:grpSpPr>
+      <p:sp>
+        <p:nvSpPr>
+          <p:cNvPr id="64" name="PlaceHolder 1"/>
+          <p:cNvSpPr>
+            <a:spLocks noGrp="1"/>
+          </p:cNvSpPr>
+          <p:nvPr>
+            <p:ph type="title"/>
+          </p:nvPr>
+        </p:nvSpPr>
+        <p:spPr>
+          <a:xfrm>
+            <a:off x="609480" y="273600"/>
+            <a:ext cx="10972440" cy="1144800"/>
+          </a:xfrm>
+          <a:prstGeom prst="rect">
+            <a:avLst/>
+          </a:prstGeom>
+        </p:spPr>
+        <p:txBody>
+          <a:bodyPr lIns="0" tIns="0" rIns="0" bIns="0" anchor="ctr"/>
+          <a:lstStyle/>
+          <a:p>
+            <a:pPr algn="ctr"/>
+            <a:endParaRPr lang="de-DE" sz="4400" b="0" strike="noStrike" spc="-1">
+              <a:latin typeface="Arial"/>
+            </a:endParaRPr>
+          </a:p>
+        </p:txBody>
+      </p:sp>
+      <p:sp>
+        <p:nvSpPr>
+          <p:cNvPr id="65" name="PlaceHolder 2"/>
+          <p:cNvSpPr>
+            <a:spLocks noGrp="1"/>
+          </p:cNvSpPr>
+          <p:nvPr>
+            <p:ph type="body"/>
+          </p:nvPr>
+        </p:nvSpPr>
+        <p:spPr>
+          <a:xfrm>
+            <a:off x="609480" y="1604520"/>
+            <a:ext cx="5354280" cy="1896840"/>
+          </a:xfrm>
+          <a:prstGeom prst="rect">
+            <a:avLst/>
+          </a:prstGeom>
+        </p:spPr>
+        <p:txBody>
+          <a:bodyPr lIns="0" tIns="0" rIns="0" bIns="0">
+            <a:normAutofit/>
+          </a:bodyPr>
+          <a:lstStyle/>
+          <a:p>
+            <a:endParaRPr lang="de-DE" sz="3200" b="0" strike="noStrike" spc="-1">
+              <a:latin typeface="Arial"/>
+            </a:endParaRPr>
+          </a:p>
+        </p:txBody>
+      </p:sp>
+      <p:sp>
+        <p:nvSpPr>
+          <p:cNvPr id="66" name="PlaceHolder 3"/>
+          <p:cNvSpPr>
+            <a:spLocks noGrp="1"/>
+          </p:cNvSpPr>
+          <p:nvPr>
+            <p:ph type="body"/>
+          </p:nvPr>
+        </p:nvSpPr>
+        <p:spPr>
+          <a:xfrm>
+            <a:off x="6231960" y="1604520"/>
+            <a:ext cx="5354280" cy="1896840"/>
+          </a:xfrm>
+          <a:prstGeom prst="rect">
+            <a:avLst/>
+          </a:prstGeom>
+        </p:spPr>
+        <p:txBody>
+          <a:bodyPr lIns="0" tIns="0" rIns="0" bIns="0">
+            <a:normAutofit/>
+          </a:bodyPr>
+          <a:lstStyle/>
+          <a:p>
+            <a:endParaRPr lang="de-DE" sz="3200" b="0" strike="noStrike" spc="-1">
+              <a:latin typeface="Arial"/>
+            </a:endParaRPr>
+          </a:p>
+        </p:txBody>
+      </p:sp>
+      <p:sp>
+        <p:nvSpPr>
+          <p:cNvPr id="67" name="PlaceHolder 4"/>
+          <p:cNvSpPr>
+            <a:spLocks noGrp="1"/>
+          </p:cNvSpPr>
+          <p:nvPr>
+            <p:ph type="body"/>
+          </p:nvPr>
+        </p:nvSpPr>
+        <p:spPr>
+          <a:xfrm>
+            <a:off x="609480" y="3682080"/>
+            <a:ext cx="5354280" cy="1896840"/>
+          </a:xfrm>
+          <a:prstGeom prst="rect">
+            <a:avLst/>
+          </a:prstGeom>
+        </p:spPr>
+        <p:txBody>
+          <a:bodyPr lIns="0" tIns="0" rIns="0" bIns="0">
+            <a:normAutofit/>
+          </a:bodyPr>
+          <a:lstStyle/>
+          <a:p>
+            <a:endParaRPr lang="de-DE" sz="3200" b="0" strike="noStrike" spc="-1">
+              <a:latin typeface="Arial"/>
+            </a:endParaRPr>
+          </a:p>
+        </p:txBody>
+      </p:sp>
+      <p:sp>
+        <p:nvSpPr>
+          <p:cNvPr id="68" name="PlaceHolder 5"/>
+          <p:cNvSpPr>
+            <a:spLocks noGrp="1"/>
+          </p:cNvSpPr>
+          <p:nvPr>
+            <p:ph type="body"/>
+          </p:nvPr>
+        </p:nvSpPr>
+        <p:spPr>
+          <a:xfrm>
+            <a:off x="6231960" y="3682080"/>
+            <a:ext cx="5354280" cy="1896840"/>
+          </a:xfrm>
+          <a:prstGeom prst="rect">
+            <a:avLst/>
+          </a:prstGeom>
+        </p:spPr>
+        <p:txBody>
+          <a:bodyPr lIns="0" tIns="0" rIns="0" bIns="0">
+            <a:normAutofit/>
+          </a:bodyPr>
+          <a:lstStyle/>
+          <a:p>
+            <a:endParaRPr lang="de-DE" sz="3200" b="0" strike="noStrike" spc="-1">
+              <a:latin typeface="Arial"/>
+            </a:endParaRPr>
+          </a:p>
+        </p:txBody>
+      </p:sp>
+    </p:spTree>
+    <p:extLst>
+      <p:ext uri="{BB962C8B-B14F-4D97-AF65-F5344CB8AC3E}">
+        <p14:creationId xmlns:p14="http://schemas.microsoft.com/office/powerpoint/2010/main" val="1975968259"/>
+      </p:ext>
+    </p:extLst>
+  </p:cSld>
+  <p:clrMapOvr>
+    <a:masterClrMapping/>
+  </p:clrMapOvr>
+</p:sldLayout>
+</file>
+
+<file path=ppt/slideLayouts/slideLayout23.xml><?xml version="1.0" encoding="utf-8"?>
+<p:sldLayout xmlns:a="http://schemas.openxmlformats.org/drawingml/2006/main" xmlns:r="http://schemas.openxmlformats.org/officeDocument/2006/relationships" xmlns:p="http://schemas.openxmlformats.org/presentationml/2006/main" type="blank" preserve="1">
+  <p:cSld name="Title, 6 Content">
+    <p:spTree>
+      <p:nvGrpSpPr>
+        <p:cNvPr id="1" name=""/>
+        <p:cNvGrpSpPr/>
+        <p:nvPr/>
+      </p:nvGrpSpPr>
+      <p:grpSpPr>
+        <a:xfrm>
+          <a:off x="0" y="0"/>
+          <a:ext cx="0" cy="0"/>
+          <a:chOff x="0" y="0"/>
+          <a:chExt cx="0" cy="0"/>
+        </a:xfrm>
+      </p:grpSpPr>
+      <p:sp>
+        <p:nvSpPr>
+          <p:cNvPr id="69" name="PlaceHolder 1"/>
+          <p:cNvSpPr>
+            <a:spLocks noGrp="1"/>
+          </p:cNvSpPr>
+          <p:nvPr>
+            <p:ph type="title"/>
+          </p:nvPr>
+        </p:nvSpPr>
+        <p:spPr>
+          <a:xfrm>
+            <a:off x="609480" y="273600"/>
+            <a:ext cx="10972440" cy="1144800"/>
+          </a:xfrm>
+          <a:prstGeom prst="rect">
+            <a:avLst/>
+          </a:prstGeom>
+        </p:spPr>
+        <p:txBody>
+          <a:bodyPr lIns="0" tIns="0" rIns="0" bIns="0" anchor="ctr"/>
+          <a:lstStyle/>
+          <a:p>
+            <a:pPr algn="ctr"/>
+            <a:endParaRPr lang="de-DE" sz="4400" b="0" strike="noStrike" spc="-1">
+              <a:latin typeface="Arial"/>
+            </a:endParaRPr>
+          </a:p>
+        </p:txBody>
+      </p:sp>
+      <p:sp>
+        <p:nvSpPr>
+          <p:cNvPr id="70" name="PlaceHolder 2"/>
+          <p:cNvSpPr>
+            <a:spLocks noGrp="1"/>
+          </p:cNvSpPr>
+          <p:nvPr>
+            <p:ph type="body"/>
+          </p:nvPr>
+        </p:nvSpPr>
+        <p:spPr>
+          <a:xfrm>
+            <a:off x="609480" y="1604520"/>
+            <a:ext cx="3533040" cy="1896840"/>
+          </a:xfrm>
+          <a:prstGeom prst="rect">
+            <a:avLst/>
+          </a:prstGeom>
+        </p:spPr>
+        <p:txBody>
+          <a:bodyPr lIns="0" tIns="0" rIns="0" bIns="0">
+            <a:normAutofit/>
+          </a:bodyPr>
+          <a:lstStyle/>
+          <a:p>
+            <a:endParaRPr lang="de-DE" sz="3200" b="0" strike="noStrike" spc="-1">
+              <a:latin typeface="Arial"/>
+            </a:endParaRPr>
+          </a:p>
+        </p:txBody>
+      </p:sp>
+      <p:sp>
+        <p:nvSpPr>
+          <p:cNvPr id="71" name="PlaceHolder 3"/>
+          <p:cNvSpPr>
+            <a:spLocks noGrp="1"/>
+          </p:cNvSpPr>
+          <p:nvPr>
+            <p:ph type="body"/>
+          </p:nvPr>
+        </p:nvSpPr>
+        <p:spPr>
+          <a:xfrm>
+            <a:off x="4319640" y="1604520"/>
+            <a:ext cx="3533040" cy="1896840"/>
+          </a:xfrm>
+          <a:prstGeom prst="rect">
+            <a:avLst/>
+          </a:prstGeom>
+        </p:spPr>
+        <p:txBody>
+          <a:bodyPr lIns="0" tIns="0" rIns="0" bIns="0">
+            <a:normAutofit/>
+          </a:bodyPr>
+          <a:lstStyle/>
+          <a:p>
+            <a:endParaRPr lang="de-DE" sz="3200" b="0" strike="noStrike" spc="-1">
+              <a:latin typeface="Arial"/>
+            </a:endParaRPr>
+          </a:p>
+        </p:txBody>
+      </p:sp>
+      <p:sp>
+        <p:nvSpPr>
+          <p:cNvPr id="72" name="PlaceHolder 4"/>
+          <p:cNvSpPr>
+            <a:spLocks noGrp="1"/>
+          </p:cNvSpPr>
+          <p:nvPr>
+            <p:ph type="body"/>
+          </p:nvPr>
+        </p:nvSpPr>
+        <p:spPr>
+          <a:xfrm>
+            <a:off x="8029800" y="1604520"/>
+            <a:ext cx="3533040" cy="1896840"/>
+          </a:xfrm>
+          <a:prstGeom prst="rect">
+            <a:avLst/>
+          </a:prstGeom>
+        </p:spPr>
+        <p:txBody>
+          <a:bodyPr lIns="0" tIns="0" rIns="0" bIns="0">
+            <a:normAutofit/>
+          </a:bodyPr>
+          <a:lstStyle/>
+          <a:p>
+            <a:endParaRPr lang="de-DE" sz="3200" b="0" strike="noStrike" spc="-1">
+              <a:latin typeface="Arial"/>
+            </a:endParaRPr>
+          </a:p>
+        </p:txBody>
+      </p:sp>
+      <p:sp>
+        <p:nvSpPr>
+          <p:cNvPr id="73" name="PlaceHolder 5"/>
+          <p:cNvSpPr>
+            <a:spLocks noGrp="1"/>
+          </p:cNvSpPr>
+          <p:nvPr>
+            <p:ph type="body"/>
+          </p:nvPr>
+        </p:nvSpPr>
+        <p:spPr>
+          <a:xfrm>
+            <a:off x="609480" y="3682080"/>
+            <a:ext cx="3533040" cy="1896840"/>
+          </a:xfrm>
+          <a:prstGeom prst="rect">
+            <a:avLst/>
+          </a:prstGeom>
+        </p:spPr>
+        <p:txBody>
+          <a:bodyPr lIns="0" tIns="0" rIns="0" bIns="0">
+            <a:normAutofit/>
+          </a:bodyPr>
+          <a:lstStyle/>
+          <a:p>
+            <a:endParaRPr lang="de-DE" sz="3200" b="0" strike="noStrike" spc="-1">
+              <a:latin typeface="Arial"/>
+            </a:endParaRPr>
+          </a:p>
+        </p:txBody>
+      </p:sp>
+      <p:sp>
+        <p:nvSpPr>
+          <p:cNvPr id="74" name="PlaceHolder 6"/>
+          <p:cNvSpPr>
+            <a:spLocks noGrp="1"/>
+          </p:cNvSpPr>
+          <p:nvPr>
+            <p:ph type="body"/>
+          </p:nvPr>
+        </p:nvSpPr>
+        <p:spPr>
+          <a:xfrm>
+            <a:off x="4319640" y="3682080"/>
+            <a:ext cx="3533040" cy="1896840"/>
+          </a:xfrm>
+          <a:prstGeom prst="rect">
+            <a:avLst/>
+          </a:prstGeom>
+        </p:spPr>
+        <p:txBody>
+          <a:bodyPr lIns="0" tIns="0" rIns="0" bIns="0">
+            <a:normAutofit/>
+          </a:bodyPr>
+          <a:lstStyle/>
+          <a:p>
+            <a:endParaRPr lang="de-DE" sz="3200" b="0" strike="noStrike" spc="-1">
+              <a:latin typeface="Arial"/>
+            </a:endParaRPr>
+          </a:p>
+        </p:txBody>
+      </p:sp>
+      <p:sp>
+        <p:nvSpPr>
+          <p:cNvPr id="75" name="PlaceHolder 7"/>
+          <p:cNvSpPr>
+            <a:spLocks noGrp="1"/>
+          </p:cNvSpPr>
+          <p:nvPr>
+            <p:ph type="body"/>
+          </p:nvPr>
+        </p:nvSpPr>
+        <p:spPr>
+          <a:xfrm>
+            <a:off x="8029800" y="3682080"/>
+            <a:ext cx="3533040" cy="1896840"/>
+          </a:xfrm>
+          <a:prstGeom prst="rect">
+            <a:avLst/>
+          </a:prstGeom>
+        </p:spPr>
+        <p:txBody>
+          <a:bodyPr lIns="0" tIns="0" rIns="0" bIns="0">
+            <a:normAutofit/>
+          </a:bodyPr>
+          <a:lstStyle/>
+          <a:p>
+            <a:endParaRPr lang="de-DE" sz="3200" b="0" strike="noStrike" spc="-1">
+              <a:latin typeface="Arial"/>
+            </a:endParaRPr>
+          </a:p>
+        </p:txBody>
+      </p:sp>
+    </p:spTree>
+    <p:extLst>
+      <p:ext uri="{BB962C8B-B14F-4D97-AF65-F5344CB8AC3E}">
+        <p14:creationId xmlns:p14="http://schemas.microsoft.com/office/powerpoint/2010/main" val="2563594432"/>
       </p:ext>
     </p:extLst>
   </p:cSld>
@@ -3398,6 +4864,528 @@
     <p:sldLayoutId id="2147483659" r:id="rId11"/>
   </p:sldLayoutIdLst>
   <p:hf hdr="0" ftr="0" dt="0"/>
+  <p:txStyles>
+    <p:titleStyle>
+      <a:lvl1pPr algn="l" defTabSz="914400" rtl="0" eaLnBrk="1" latinLnBrk="0" hangingPunct="1">
+        <a:lnSpc>
+          <a:spcPct val="90000"/>
+        </a:lnSpc>
+        <a:spcBef>
+          <a:spcPct val="0"/>
+        </a:spcBef>
+        <a:buNone/>
+        <a:defRPr sz="4400" kern="1200">
+          <a:solidFill>
+            <a:schemeClr val="tx1"/>
+          </a:solidFill>
+          <a:latin typeface="+mj-lt"/>
+          <a:ea typeface="+mj-ea"/>
+          <a:cs typeface="+mj-cs"/>
+        </a:defRPr>
+      </a:lvl1pPr>
+    </p:titleStyle>
+    <p:bodyStyle>
+      <a:lvl1pPr marL="228600" indent="-228600" algn="l" defTabSz="914400" rtl="0" eaLnBrk="1" latinLnBrk="0" hangingPunct="1">
+        <a:lnSpc>
+          <a:spcPct val="90000"/>
+        </a:lnSpc>
+        <a:spcBef>
+          <a:spcPts val="1000"/>
+        </a:spcBef>
+        <a:buFont typeface="Arial" panose="020B0604020202020204" pitchFamily="34" charset="0"/>
+        <a:buChar char="•"/>
+        <a:defRPr sz="2800" kern="1200">
+          <a:solidFill>
+            <a:schemeClr val="tx1"/>
+          </a:solidFill>
+          <a:latin typeface="+mn-lt"/>
+          <a:ea typeface="+mn-ea"/>
+          <a:cs typeface="+mn-cs"/>
+        </a:defRPr>
+      </a:lvl1pPr>
+      <a:lvl2pPr marL="685800" indent="-228600" algn="l" defTabSz="914400" rtl="0" eaLnBrk="1" latinLnBrk="0" hangingPunct="1">
+        <a:lnSpc>
+          <a:spcPct val="90000"/>
+        </a:lnSpc>
+        <a:spcBef>
+          <a:spcPts val="500"/>
+        </a:spcBef>
+        <a:buFont typeface="Arial" panose="020B0604020202020204" pitchFamily="34" charset="0"/>
+        <a:buChar char="•"/>
+        <a:defRPr sz="2400" kern="1200">
+          <a:solidFill>
+            <a:schemeClr val="tx1"/>
+          </a:solidFill>
+          <a:latin typeface="+mn-lt"/>
+          <a:ea typeface="+mn-ea"/>
+          <a:cs typeface="+mn-cs"/>
+        </a:defRPr>
+      </a:lvl2pPr>
+      <a:lvl3pPr marL="1143000" indent="-228600" algn="l" defTabSz="914400" rtl="0" eaLnBrk="1" latinLnBrk="0" hangingPunct="1">
+        <a:lnSpc>
+          <a:spcPct val="90000"/>
+        </a:lnSpc>
+        <a:spcBef>
+          <a:spcPts val="500"/>
+        </a:spcBef>
+        <a:buFont typeface="Arial" panose="020B0604020202020204" pitchFamily="34" charset="0"/>
+        <a:buChar char="•"/>
+        <a:defRPr sz="2000" kern="1200">
+          <a:solidFill>
+            <a:schemeClr val="tx1"/>
+          </a:solidFill>
+          <a:latin typeface="+mn-lt"/>
+          <a:ea typeface="+mn-ea"/>
+          <a:cs typeface="+mn-cs"/>
+        </a:defRPr>
+      </a:lvl3pPr>
+      <a:lvl4pPr marL="1600200" indent="-228600" algn="l" defTabSz="914400" rtl="0" eaLnBrk="1" latinLnBrk="0" hangingPunct="1">
+        <a:lnSpc>
+          <a:spcPct val="90000"/>
+        </a:lnSpc>
+        <a:spcBef>
+          <a:spcPts val="500"/>
+        </a:spcBef>
+        <a:buFont typeface="Arial" panose="020B0604020202020204" pitchFamily="34" charset="0"/>
+        <a:buChar char="•"/>
+        <a:defRPr sz="1800" kern="1200">
+          <a:solidFill>
+            <a:schemeClr val="tx1"/>
+          </a:solidFill>
+          <a:latin typeface="+mn-lt"/>
+          <a:ea typeface="+mn-ea"/>
+          <a:cs typeface="+mn-cs"/>
+        </a:defRPr>
+      </a:lvl4pPr>
+      <a:lvl5pPr marL="2057400" indent="-228600" algn="l" defTabSz="914400" rtl="0" eaLnBrk="1" latinLnBrk="0" hangingPunct="1">
+        <a:lnSpc>
+          <a:spcPct val="90000"/>
+        </a:lnSpc>
+        <a:spcBef>
+          <a:spcPts val="500"/>
+        </a:spcBef>
+        <a:buFont typeface="Arial" panose="020B0604020202020204" pitchFamily="34" charset="0"/>
+        <a:buChar char="•"/>
+        <a:defRPr sz="1800" kern="1200">
+          <a:solidFill>
+            <a:schemeClr val="tx1"/>
+          </a:solidFill>
+          <a:latin typeface="+mn-lt"/>
+          <a:ea typeface="+mn-ea"/>
+          <a:cs typeface="+mn-cs"/>
+        </a:defRPr>
+      </a:lvl5pPr>
+      <a:lvl6pPr marL="2514600" indent="-228600" algn="l" defTabSz="914400" rtl="0" eaLnBrk="1" latinLnBrk="0" hangingPunct="1">
+        <a:lnSpc>
+          <a:spcPct val="90000"/>
+        </a:lnSpc>
+        <a:spcBef>
+          <a:spcPts val="500"/>
+        </a:spcBef>
+        <a:buFont typeface="Arial" panose="020B0604020202020204" pitchFamily="34" charset="0"/>
+        <a:buChar char="•"/>
+        <a:defRPr sz="1800" kern="1200">
+          <a:solidFill>
+            <a:schemeClr val="tx1"/>
+          </a:solidFill>
+          <a:latin typeface="+mn-lt"/>
+          <a:ea typeface="+mn-ea"/>
+          <a:cs typeface="+mn-cs"/>
+        </a:defRPr>
+      </a:lvl6pPr>
+      <a:lvl7pPr marL="2971800" indent="-228600" algn="l" defTabSz="914400" rtl="0" eaLnBrk="1" latinLnBrk="0" hangingPunct="1">
+        <a:lnSpc>
+          <a:spcPct val="90000"/>
+        </a:lnSpc>
+        <a:spcBef>
+          <a:spcPts val="500"/>
+        </a:spcBef>
+        <a:buFont typeface="Arial" panose="020B0604020202020204" pitchFamily="34" charset="0"/>
+        <a:buChar char="•"/>
+        <a:defRPr sz="1800" kern="1200">
+          <a:solidFill>
+            <a:schemeClr val="tx1"/>
+          </a:solidFill>
+          <a:latin typeface="+mn-lt"/>
+          <a:ea typeface="+mn-ea"/>
+          <a:cs typeface="+mn-cs"/>
+        </a:defRPr>
+      </a:lvl7pPr>
+      <a:lvl8pPr marL="3429000" indent="-228600" algn="l" defTabSz="914400" rtl="0" eaLnBrk="1" latinLnBrk="0" hangingPunct="1">
+        <a:lnSpc>
+          <a:spcPct val="90000"/>
+        </a:lnSpc>
+        <a:spcBef>
+          <a:spcPts val="500"/>
+        </a:spcBef>
+        <a:buFont typeface="Arial" panose="020B0604020202020204" pitchFamily="34" charset="0"/>
+        <a:buChar char="•"/>
+        <a:defRPr sz="1800" kern="1200">
+          <a:solidFill>
+            <a:schemeClr val="tx1"/>
+          </a:solidFill>
+          <a:latin typeface="+mn-lt"/>
+          <a:ea typeface="+mn-ea"/>
+          <a:cs typeface="+mn-cs"/>
+        </a:defRPr>
+      </a:lvl8pPr>
+      <a:lvl9pPr marL="3886200" indent="-228600" algn="l" defTabSz="914400" rtl="0" eaLnBrk="1" latinLnBrk="0" hangingPunct="1">
+        <a:lnSpc>
+          <a:spcPct val="90000"/>
+        </a:lnSpc>
+        <a:spcBef>
+          <a:spcPts val="500"/>
+        </a:spcBef>
+        <a:buFont typeface="Arial" panose="020B0604020202020204" pitchFamily="34" charset="0"/>
+        <a:buChar char="•"/>
+        <a:defRPr sz="1800" kern="1200">
+          <a:solidFill>
+            <a:schemeClr val="tx1"/>
+          </a:solidFill>
+          <a:latin typeface="+mn-lt"/>
+          <a:ea typeface="+mn-ea"/>
+          <a:cs typeface="+mn-cs"/>
+        </a:defRPr>
+      </a:lvl9pPr>
+    </p:bodyStyle>
+    <p:otherStyle>
+      <a:defPPr>
+        <a:defRPr lang="de-DE"/>
+      </a:defPPr>
+      <a:lvl1pPr marL="0" algn="l" defTabSz="914400" rtl="0" eaLnBrk="1" latinLnBrk="0" hangingPunct="1">
+        <a:defRPr sz="1800" kern="1200">
+          <a:solidFill>
+            <a:schemeClr val="tx1"/>
+          </a:solidFill>
+          <a:latin typeface="+mn-lt"/>
+          <a:ea typeface="+mn-ea"/>
+          <a:cs typeface="+mn-cs"/>
+        </a:defRPr>
+      </a:lvl1pPr>
+      <a:lvl2pPr marL="457200" algn="l" defTabSz="914400" rtl="0" eaLnBrk="1" latinLnBrk="0" hangingPunct="1">
+        <a:defRPr sz="1800" kern="1200">
+          <a:solidFill>
+            <a:schemeClr val="tx1"/>
+          </a:solidFill>
+          <a:latin typeface="+mn-lt"/>
+          <a:ea typeface="+mn-ea"/>
+          <a:cs typeface="+mn-cs"/>
+        </a:defRPr>
+      </a:lvl2pPr>
+      <a:lvl3pPr marL="914400" algn="l" defTabSz="914400" rtl="0" eaLnBrk="1" latinLnBrk="0" hangingPunct="1">
+        <a:defRPr sz="1800" kern="1200">
+          <a:solidFill>
+            <a:schemeClr val="tx1"/>
+          </a:solidFill>
+          <a:latin typeface="+mn-lt"/>
+          <a:ea typeface="+mn-ea"/>
+          <a:cs typeface="+mn-cs"/>
+        </a:defRPr>
+      </a:lvl3pPr>
+      <a:lvl4pPr marL="1371600" algn="l" defTabSz="914400" rtl="0" eaLnBrk="1" latinLnBrk="0" hangingPunct="1">
+        <a:defRPr sz="1800" kern="1200">
+          <a:solidFill>
+            <a:schemeClr val="tx1"/>
+          </a:solidFill>
+          <a:latin typeface="+mn-lt"/>
+          <a:ea typeface="+mn-ea"/>
+          <a:cs typeface="+mn-cs"/>
+        </a:defRPr>
+      </a:lvl4pPr>
+      <a:lvl5pPr marL="1828800" algn="l" defTabSz="914400" rtl="0" eaLnBrk="1" latinLnBrk="0" hangingPunct="1">
+        <a:defRPr sz="1800" kern="1200">
+          <a:solidFill>
+            <a:schemeClr val="tx1"/>
+          </a:solidFill>
+          <a:latin typeface="+mn-lt"/>
+          <a:ea typeface="+mn-ea"/>
+          <a:cs typeface="+mn-cs"/>
+        </a:defRPr>
+      </a:lvl5pPr>
+      <a:lvl6pPr marL="2286000" algn="l" defTabSz="914400" rtl="0" eaLnBrk="1" latinLnBrk="0" hangingPunct="1">
+        <a:defRPr sz="1800" kern="1200">
+          <a:solidFill>
+            <a:schemeClr val="tx1"/>
+          </a:solidFill>
+          <a:latin typeface="+mn-lt"/>
+          <a:ea typeface="+mn-ea"/>
+          <a:cs typeface="+mn-cs"/>
+        </a:defRPr>
+      </a:lvl6pPr>
+      <a:lvl7pPr marL="2743200" algn="l" defTabSz="914400" rtl="0" eaLnBrk="1" latinLnBrk="0" hangingPunct="1">
+        <a:defRPr sz="1800" kern="1200">
+          <a:solidFill>
+            <a:schemeClr val="tx1"/>
+          </a:solidFill>
+          <a:latin typeface="+mn-lt"/>
+          <a:ea typeface="+mn-ea"/>
+          <a:cs typeface="+mn-cs"/>
+        </a:defRPr>
+      </a:lvl7pPr>
+      <a:lvl8pPr marL="3200400" algn="l" defTabSz="914400" rtl="0" eaLnBrk="1" latinLnBrk="0" hangingPunct="1">
+        <a:defRPr sz="1800" kern="1200">
+          <a:solidFill>
+            <a:schemeClr val="tx1"/>
+          </a:solidFill>
+          <a:latin typeface="+mn-lt"/>
+          <a:ea typeface="+mn-ea"/>
+          <a:cs typeface="+mn-cs"/>
+        </a:defRPr>
+      </a:lvl8pPr>
+      <a:lvl9pPr marL="3657600" algn="l" defTabSz="914400" rtl="0" eaLnBrk="1" latinLnBrk="0" hangingPunct="1">
+        <a:defRPr sz="1800" kern="1200">
+          <a:solidFill>
+            <a:schemeClr val="tx1"/>
+          </a:solidFill>
+          <a:latin typeface="+mn-lt"/>
+          <a:ea typeface="+mn-ea"/>
+          <a:cs typeface="+mn-cs"/>
+        </a:defRPr>
+      </a:lvl9pPr>
+    </p:otherStyle>
+  </p:txStyles>
+</p:sldMaster>
+</file>
+
+<file path=ppt/slideMasters/slideMaster2.xml><?xml version="1.0" encoding="utf-8"?>
+<p:sldMaster xmlns:a="http://schemas.openxmlformats.org/drawingml/2006/main" xmlns:r="http://schemas.openxmlformats.org/officeDocument/2006/relationships" xmlns:p="http://schemas.openxmlformats.org/presentationml/2006/main">
+  <p:cSld>
+    <p:bg>
+      <p:bgPr>
+        <a:solidFill>
+          <a:srgbClr val="FFFFFF"/>
+        </a:solidFill>
+        <a:effectLst/>
+      </p:bgPr>
+    </p:bg>
+    <p:spTree>
+      <p:nvGrpSpPr>
+        <p:cNvPr id="1" name=""/>
+        <p:cNvGrpSpPr/>
+        <p:nvPr/>
+      </p:nvGrpSpPr>
+      <p:grpSpPr>
+        <a:xfrm>
+          <a:off x="0" y="0"/>
+          <a:ext cx="0" cy="0"/>
+          <a:chOff x="0" y="0"/>
+          <a:chExt cx="0" cy="0"/>
+        </a:xfrm>
+      </p:grpSpPr>
+      <p:sp>
+        <p:nvSpPr>
+          <p:cNvPr id="38" name="PlaceHolder 1"/>
+          <p:cNvSpPr>
+            <a:spLocks noGrp="1"/>
+          </p:cNvSpPr>
+          <p:nvPr>
+            <p:ph type="title"/>
+          </p:nvPr>
+        </p:nvSpPr>
+        <p:spPr>
+          <a:xfrm>
+            <a:off x="609480" y="273600"/>
+            <a:ext cx="10972440" cy="1144800"/>
+          </a:xfrm>
+          <a:prstGeom prst="rect">
+            <a:avLst/>
+          </a:prstGeom>
+        </p:spPr>
+        <p:txBody>
+          <a:bodyPr lIns="0" tIns="0" rIns="0" bIns="0" anchor="ctr"/>
+          <a:lstStyle/>
+          <a:p>
+            <a:pPr algn="ctr"/>
+            <a:r>
+              <a:rPr lang="de-DE" sz="4400" b="0" strike="noStrike" spc="-1">
+                <a:latin typeface="Arial"/>
+              </a:rPr>
+              <a:t>Format des Titeltextes durch Klicken bearbeiten</a:t>
+            </a:r>
+          </a:p>
+        </p:txBody>
+      </p:sp>
+      <p:sp>
+        <p:nvSpPr>
+          <p:cNvPr id="39" name="PlaceHolder 2"/>
+          <p:cNvSpPr>
+            <a:spLocks noGrp="1"/>
+          </p:cNvSpPr>
+          <p:nvPr>
+            <p:ph type="body"/>
+          </p:nvPr>
+        </p:nvSpPr>
+        <p:spPr>
+          <a:xfrm>
+            <a:off x="609480" y="1604520"/>
+            <a:ext cx="10972440" cy="3977280"/>
+          </a:xfrm>
+          <a:prstGeom prst="rect">
+            <a:avLst/>
+          </a:prstGeom>
+        </p:spPr>
+        <p:txBody>
+          <a:bodyPr lIns="0" tIns="0" rIns="0" bIns="0">
+            <a:normAutofit/>
+          </a:bodyPr>
+          <a:lstStyle/>
+          <a:p>
+            <a:pPr marL="432000" indent="-324000">
+              <a:spcBef>
+                <a:spcPts val="1417"/>
+              </a:spcBef>
+              <a:buClr>
+                <a:srgbClr val="000000"/>
+              </a:buClr>
+              <a:buSzPct val="45000"/>
+              <a:buFont typeface="Wingdings" charset="2"/>
+              <a:buChar char=""/>
+            </a:pPr>
+            <a:r>
+              <a:rPr lang="de-DE" sz="3200" b="0" strike="noStrike" spc="-1">
+                <a:latin typeface="Arial"/>
+              </a:rPr>
+              <a:t>Format des Gliederungstextes durch Klicken bearbeiten</a:t>
+            </a:r>
+          </a:p>
+          <a:p>
+            <a:pPr marL="864000" lvl="1" indent="-324000">
+              <a:spcBef>
+                <a:spcPts val="1134"/>
+              </a:spcBef>
+              <a:buClr>
+                <a:srgbClr val="000000"/>
+              </a:buClr>
+              <a:buSzPct val="75000"/>
+              <a:buFont typeface="Symbol" charset="2"/>
+              <a:buChar char=""/>
+            </a:pPr>
+            <a:r>
+              <a:rPr lang="de-DE" sz="2800" b="0" strike="noStrike" spc="-1">
+                <a:latin typeface="Arial"/>
+              </a:rPr>
+              <a:t>Zweite Gliederungsebene</a:t>
+            </a:r>
+          </a:p>
+          <a:p>
+            <a:pPr marL="1296000" lvl="2" indent="-288000">
+              <a:spcBef>
+                <a:spcPts val="850"/>
+              </a:spcBef>
+              <a:buClr>
+                <a:srgbClr val="000000"/>
+              </a:buClr>
+              <a:buSzPct val="45000"/>
+              <a:buFont typeface="Wingdings" charset="2"/>
+              <a:buChar char=""/>
+            </a:pPr>
+            <a:r>
+              <a:rPr lang="de-DE" sz="2400" b="0" strike="noStrike" spc="-1">
+                <a:latin typeface="Arial"/>
+              </a:rPr>
+              <a:t>Dritte Gliederungsebene</a:t>
+            </a:r>
+          </a:p>
+          <a:p>
+            <a:pPr marL="1728000" lvl="3" indent="-216000">
+              <a:spcBef>
+                <a:spcPts val="567"/>
+              </a:spcBef>
+              <a:buClr>
+                <a:srgbClr val="000000"/>
+              </a:buClr>
+              <a:buSzPct val="75000"/>
+              <a:buFont typeface="Symbol" charset="2"/>
+              <a:buChar char=""/>
+            </a:pPr>
+            <a:r>
+              <a:rPr lang="de-DE" sz="2000" b="0" strike="noStrike" spc="-1">
+                <a:latin typeface="Arial"/>
+              </a:rPr>
+              <a:t>Vierte Gliederungsebene</a:t>
+            </a:r>
+          </a:p>
+          <a:p>
+            <a:pPr marL="2160000" lvl="4" indent="-216000">
+              <a:spcBef>
+                <a:spcPts val="283"/>
+              </a:spcBef>
+              <a:buClr>
+                <a:srgbClr val="000000"/>
+              </a:buClr>
+              <a:buSzPct val="45000"/>
+              <a:buFont typeface="Wingdings" charset="2"/>
+              <a:buChar char=""/>
+            </a:pPr>
+            <a:r>
+              <a:rPr lang="de-DE" sz="2000" b="0" strike="noStrike" spc="-1">
+                <a:latin typeface="Arial"/>
+              </a:rPr>
+              <a:t>Fünfte Gliederungsebene</a:t>
+            </a:r>
+          </a:p>
+          <a:p>
+            <a:pPr marL="2592000" lvl="5" indent="-216000">
+              <a:spcBef>
+                <a:spcPts val="283"/>
+              </a:spcBef>
+              <a:buClr>
+                <a:srgbClr val="000000"/>
+              </a:buClr>
+              <a:buSzPct val="45000"/>
+              <a:buFont typeface="Wingdings" charset="2"/>
+              <a:buChar char=""/>
+            </a:pPr>
+            <a:r>
+              <a:rPr lang="de-DE" sz="2000" b="0" strike="noStrike" spc="-1">
+                <a:latin typeface="Arial"/>
+              </a:rPr>
+              <a:t>Sechste Gliederungsebene</a:t>
+            </a:r>
+          </a:p>
+          <a:p>
+            <a:pPr marL="3024000" lvl="6" indent="-216000">
+              <a:spcBef>
+                <a:spcPts val="283"/>
+              </a:spcBef>
+              <a:buClr>
+                <a:srgbClr val="000000"/>
+              </a:buClr>
+              <a:buSzPct val="45000"/>
+              <a:buFont typeface="Wingdings" charset="2"/>
+              <a:buChar char=""/>
+            </a:pPr>
+            <a:r>
+              <a:rPr lang="de-DE" sz="2000" b="0" strike="noStrike" spc="-1">
+                <a:latin typeface="Arial"/>
+              </a:rPr>
+              <a:t>Siebte Gliederungsebene</a:t>
+            </a:r>
+          </a:p>
+        </p:txBody>
+      </p:sp>
+    </p:spTree>
+    <p:extLst>
+      <p:ext uri="{BB962C8B-B14F-4D97-AF65-F5344CB8AC3E}">
+        <p14:creationId xmlns:p14="http://schemas.microsoft.com/office/powerpoint/2010/main" val="1414461311"/>
+      </p:ext>
+    </p:extLst>
+  </p:cSld>
+  <p:clrMap bg1="lt1" tx1="dk1" bg2="lt2" tx2="dk2" accent1="accent1" accent2="accent2" accent3="accent3" accent4="accent4" accent5="accent5" accent6="accent6" hlink="hlink" folHlink="folHlink"/>
+  <p:sldLayoutIdLst>
+    <p:sldLayoutId id="2147483661" r:id="rId1"/>
+    <p:sldLayoutId id="2147483662" r:id="rId2"/>
+    <p:sldLayoutId id="2147483663" r:id="rId3"/>
+    <p:sldLayoutId id="2147483664" r:id="rId4"/>
+    <p:sldLayoutId id="2147483665" r:id="rId5"/>
+    <p:sldLayoutId id="2147483666" r:id="rId6"/>
+    <p:sldLayoutId id="2147483667" r:id="rId7"/>
+    <p:sldLayoutId id="2147483668" r:id="rId8"/>
+    <p:sldLayoutId id="2147483669" r:id="rId9"/>
+    <p:sldLayoutId id="2147483670" r:id="rId10"/>
+    <p:sldLayoutId id="2147483671" r:id="rId11"/>
+    <p:sldLayoutId id="2147483672" r:id="rId12"/>
+  </p:sldLayoutIdLst>
   <p:txStyles>
     <p:titleStyle>
       <a:lvl1pPr algn="l" defTabSz="914400" rtl="0" eaLnBrk="1" latinLnBrk="0" hangingPunct="1">
@@ -4088,6 +6076,474 @@
 </file>
 
 <file path=ppt/slides/slide2.xml><?xml version="1.0" encoding="utf-8"?>
+<p:sld xmlns:a="http://schemas.openxmlformats.org/drawingml/2006/main" xmlns:r="http://schemas.openxmlformats.org/officeDocument/2006/relationships" xmlns:p="http://schemas.openxmlformats.org/presentationml/2006/main">
+  <p:cSld>
+    <p:spTree>
+      <p:nvGrpSpPr>
+        <p:cNvPr id="1" name=""/>
+        <p:cNvGrpSpPr/>
+        <p:nvPr/>
+      </p:nvGrpSpPr>
+      <p:grpSpPr>
+        <a:xfrm>
+          <a:off x="0" y="0"/>
+          <a:ext cx="0" cy="0"/>
+          <a:chOff x="0" y="0"/>
+          <a:chExt cx="0" cy="0"/>
+        </a:xfrm>
+      </p:grpSpPr>
+      <p:sp>
+        <p:nvSpPr>
+          <p:cNvPr id="4" name="Rechteck 3">
+            <a:extLst>
+              <a:ext uri="{FF2B5EF4-FFF2-40B4-BE49-F238E27FC236}">
+                <a16:creationId xmlns:a16="http://schemas.microsoft.com/office/drawing/2014/main" id="{31D922BD-85B0-4CF6-A69A-139BB2401647}"/>
+              </a:ext>
+            </a:extLst>
+          </p:cNvPr>
+          <p:cNvSpPr/>
+          <p:nvPr/>
+        </p:nvSpPr>
+        <p:spPr>
+          <a:xfrm>
+            <a:off x="0" y="-30083"/>
+            <a:ext cx="12192000" cy="1341230"/>
+          </a:xfrm>
+          <a:prstGeom prst="rect">
+            <a:avLst/>
+          </a:prstGeom>
+          <a:ln>
+            <a:noFill/>
+          </a:ln>
+        </p:spPr>
+        <p:style>
+          <a:lnRef idx="2">
+            <a:schemeClr val="accent1">
+              <a:shade val="50000"/>
+            </a:schemeClr>
+          </a:lnRef>
+          <a:fillRef idx="1">
+            <a:schemeClr val="accent1"/>
+          </a:fillRef>
+          <a:effectRef idx="0">
+            <a:schemeClr val="accent1"/>
+          </a:effectRef>
+          <a:fontRef idx="minor">
+            <a:schemeClr val="lt1"/>
+          </a:fontRef>
+        </p:style>
+        <p:txBody>
+          <a:bodyPr rtlCol="0" anchor="ctr"/>
+          <a:lstStyle/>
+          <a:p>
+            <a:pPr algn="ctr"/>
+            <a:endParaRPr lang="de-DE"/>
+          </a:p>
+        </p:txBody>
+      </p:sp>
+      <p:sp>
+        <p:nvSpPr>
+          <p:cNvPr id="119" name="CustomShape 1"/>
+          <p:cNvSpPr/>
+          <p:nvPr/>
+        </p:nvSpPr>
+        <p:spPr>
+          <a:xfrm>
+            <a:off x="838080" y="243914"/>
+            <a:ext cx="10514520" cy="1324440"/>
+          </a:xfrm>
+          <a:prstGeom prst="rect">
+            <a:avLst/>
+          </a:prstGeom>
+          <a:noFill/>
+          <a:ln>
+            <a:noFill/>
+          </a:ln>
+        </p:spPr>
+        <p:style>
+          <a:lnRef idx="0">
+            <a:scrgbClr r="0" g="0" b="0"/>
+          </a:lnRef>
+          <a:fillRef idx="0">
+            <a:scrgbClr r="0" g="0" b="0"/>
+          </a:fillRef>
+          <a:effectRef idx="0">
+            <a:scrgbClr r="0" g="0" b="0"/>
+          </a:effectRef>
+          <a:fontRef idx="minor"/>
+        </p:style>
+        <p:txBody>
+          <a:bodyPr lIns="90000" tIns="45000" rIns="90000" bIns="45000" anchor="ctr"/>
+          <a:lstStyle/>
+          <a:p>
+            <a:pPr marL="0" marR="0" lvl="0" indent="0" algn="l" defTabSz="914400" rtl="0" eaLnBrk="1" fontAlgn="auto" latinLnBrk="0" hangingPunct="1">
+              <a:lnSpc>
+                <a:spcPct val="90000"/>
+              </a:lnSpc>
+              <a:spcBef>
+                <a:spcPts val="0"/>
+              </a:spcBef>
+              <a:spcAft>
+                <a:spcPts val="0"/>
+              </a:spcAft>
+              <a:buClrTx/>
+              <a:buSzTx/>
+              <a:buFontTx/>
+              <a:buNone/>
+              <a:tabLst/>
+              <a:defRPr/>
+            </a:pPr>
+            <a:r>
+              <a:rPr kumimoji="0" lang="de-DE" sz="4400" b="1" i="0" u="none" strike="noStrike" kern="1200" cap="none" spc="-1" normalizeH="0" baseline="0" noProof="0" dirty="0">
+                <a:ln>
+                  <a:noFill/>
+                </a:ln>
+                <a:solidFill>
+                  <a:schemeClr val="bg1"/>
+                </a:solidFill>
+                <a:effectLst/>
+                <a:uLnTx/>
+                <a:uFillTx/>
+                <a:latin typeface="Calibri Light"/>
+                <a:ea typeface="DejaVu Sans"/>
+              </a:rPr>
+              <a:t>Data</a:t>
+            </a:r>
+            <a:endParaRPr kumimoji="0" lang="de-DE" sz="4400" b="0" i="0" u="none" strike="noStrike" kern="1200" cap="none" spc="-1" normalizeH="0" baseline="0" noProof="0" dirty="0">
+              <a:ln>
+                <a:noFill/>
+              </a:ln>
+              <a:solidFill>
+                <a:schemeClr val="bg1"/>
+              </a:solidFill>
+              <a:effectLst/>
+              <a:uLnTx/>
+              <a:uFillTx/>
+              <a:latin typeface="Arial"/>
+            </a:endParaRPr>
+          </a:p>
+        </p:txBody>
+      </p:sp>
+      <p:sp>
+        <p:nvSpPr>
+          <p:cNvPr id="120" name="CustomShape 2"/>
+          <p:cNvSpPr/>
+          <p:nvPr/>
+        </p:nvSpPr>
+        <p:spPr>
+          <a:xfrm>
+            <a:off x="838080" y="1825560"/>
+            <a:ext cx="10514520" cy="4350240"/>
+          </a:xfrm>
+          <a:prstGeom prst="rect">
+            <a:avLst/>
+          </a:prstGeom>
+          <a:noFill/>
+          <a:ln>
+            <a:noFill/>
+          </a:ln>
+        </p:spPr>
+        <p:style>
+          <a:lnRef idx="0">
+            <a:scrgbClr r="0" g="0" b="0"/>
+          </a:lnRef>
+          <a:fillRef idx="0">
+            <a:scrgbClr r="0" g="0" b="0"/>
+          </a:fillRef>
+          <a:effectRef idx="0">
+            <a:scrgbClr r="0" g="0" b="0"/>
+          </a:effectRef>
+          <a:fontRef idx="minor"/>
+        </p:style>
+        <p:txBody>
+          <a:bodyPr lIns="90000" tIns="45000" rIns="90000" bIns="45000"/>
+          <a:lstStyle/>
+          <a:p>
+            <a:pPr marL="228600" marR="0" lvl="0" indent="-227520" algn="l" defTabSz="914400" rtl="0" eaLnBrk="1" fontAlgn="auto" latinLnBrk="0" hangingPunct="1">
+              <a:lnSpc>
+                <a:spcPct val="150000"/>
+              </a:lnSpc>
+              <a:spcBef>
+                <a:spcPts val="0"/>
+              </a:spcBef>
+              <a:spcAft>
+                <a:spcPts val="0"/>
+              </a:spcAft>
+              <a:buClr>
+                <a:srgbClr val="000000"/>
+              </a:buClr>
+              <a:buSzTx/>
+              <a:buFont typeface="Arial"/>
+              <a:buChar char="•"/>
+              <a:tabLst/>
+              <a:defRPr/>
+            </a:pPr>
+            <a:r>
+              <a:rPr kumimoji="0" lang="de-DE" sz="2800" b="0" i="0" u="none" strike="noStrike" kern="1200" cap="none" spc="-1" normalizeH="0" baseline="0" noProof="0">
+                <a:ln>
+                  <a:noFill/>
+                </a:ln>
+                <a:solidFill>
+                  <a:srgbClr val="000000"/>
+                </a:solidFill>
+                <a:effectLst/>
+                <a:uLnTx/>
+                <a:uFillTx/>
+                <a:latin typeface="Calibri"/>
+                <a:ea typeface="Microsoft YaHei"/>
+              </a:rPr>
+              <a:t>Peripheral blood mononuclear cells (PBMCs) from a healthy donor</a:t>
+            </a:r>
+            <a:endParaRPr kumimoji="0" lang="de-DE" sz="2800" b="0" i="0" u="none" strike="noStrike" kern="1200" cap="none" spc="-1" normalizeH="0" baseline="0" noProof="0">
+              <a:ln>
+                <a:noFill/>
+              </a:ln>
+              <a:solidFill>
+                <a:prstClr val="black"/>
+              </a:solidFill>
+              <a:effectLst/>
+              <a:uLnTx/>
+              <a:uFillTx/>
+              <a:latin typeface="Arial"/>
+            </a:endParaRPr>
+          </a:p>
+          <a:p>
+            <a:pPr marL="228600" marR="0" lvl="0" indent="-227520" algn="l" defTabSz="914400" rtl="0" eaLnBrk="1" fontAlgn="auto" latinLnBrk="0" hangingPunct="1">
+              <a:lnSpc>
+                <a:spcPct val="150000"/>
+              </a:lnSpc>
+              <a:spcBef>
+                <a:spcPts val="0"/>
+              </a:spcBef>
+              <a:spcAft>
+                <a:spcPts val="0"/>
+              </a:spcAft>
+              <a:buClr>
+                <a:srgbClr val="000000"/>
+              </a:buClr>
+              <a:buSzTx/>
+              <a:buFont typeface="Arial"/>
+              <a:buChar char="•"/>
+              <a:tabLst/>
+              <a:defRPr/>
+            </a:pPr>
+            <a:r>
+              <a:rPr kumimoji="0" lang="de-DE" sz="2800" b="0" i="0" u="none" strike="noStrike" kern="1200" cap="none" spc="-1" normalizeH="0" baseline="0" noProof="0">
+                <a:ln>
+                  <a:noFill/>
+                </a:ln>
+                <a:solidFill>
+                  <a:srgbClr val="000000"/>
+                </a:solidFill>
+                <a:effectLst/>
+                <a:uLnTx/>
+                <a:uFillTx/>
+                <a:latin typeface="Calibri"/>
+                <a:ea typeface="Microsoft YaHei"/>
+              </a:rPr>
+              <a:t>PBMCs = peripheral blood cells with a round nucleus e. g. T-cells, B-cells, moncytes</a:t>
+            </a:r>
+            <a:endParaRPr kumimoji="0" lang="de-DE" sz="2800" b="0" i="0" u="none" strike="noStrike" kern="1200" cap="none" spc="-1" normalizeH="0" baseline="0" noProof="0">
+              <a:ln>
+                <a:noFill/>
+              </a:ln>
+              <a:solidFill>
+                <a:prstClr val="black"/>
+              </a:solidFill>
+              <a:effectLst/>
+              <a:uLnTx/>
+              <a:uFillTx/>
+              <a:latin typeface="Arial"/>
+            </a:endParaRPr>
+          </a:p>
+          <a:p>
+            <a:pPr marL="228600" marR="0" lvl="0" indent="-227520" algn="l" defTabSz="914400" rtl="0" eaLnBrk="1" fontAlgn="auto" latinLnBrk="0" hangingPunct="1">
+              <a:lnSpc>
+                <a:spcPct val="150000"/>
+              </a:lnSpc>
+              <a:spcBef>
+                <a:spcPts val="0"/>
+              </a:spcBef>
+              <a:spcAft>
+                <a:spcPts val="0"/>
+              </a:spcAft>
+              <a:buClr>
+                <a:srgbClr val="000000"/>
+              </a:buClr>
+              <a:buSzTx/>
+              <a:buFont typeface="Arial"/>
+              <a:buChar char="•"/>
+              <a:tabLst/>
+              <a:defRPr/>
+            </a:pPr>
+            <a:r>
+              <a:rPr kumimoji="0" lang="de-DE" sz="2800" b="0" i="0" u="none" strike="noStrike" kern="1200" cap="none" spc="-1" normalizeH="0" baseline="0" noProof="0">
+                <a:ln>
+                  <a:noFill/>
+                </a:ln>
+                <a:solidFill>
+                  <a:srgbClr val="000000"/>
+                </a:solidFill>
+                <a:effectLst/>
+                <a:uLnTx/>
+                <a:uFillTx/>
+                <a:latin typeface="Calibri"/>
+                <a:ea typeface="Microsoft YaHei"/>
+              </a:rPr>
+              <a:t>Method: UMI marked mRNA (unique molecular identifier) → ratio in cells of molecules is preserved</a:t>
+            </a:r>
+            <a:endParaRPr kumimoji="0" lang="de-DE" sz="2800" b="0" i="0" u="none" strike="noStrike" kern="1200" cap="none" spc="-1" normalizeH="0" baseline="0" noProof="0">
+              <a:ln>
+                <a:noFill/>
+              </a:ln>
+              <a:solidFill>
+                <a:prstClr val="black"/>
+              </a:solidFill>
+              <a:effectLst/>
+              <a:uLnTx/>
+              <a:uFillTx/>
+              <a:latin typeface="Arial"/>
+            </a:endParaRPr>
+          </a:p>
+          <a:p>
+            <a:pPr marL="228600" marR="0" lvl="0" indent="-227520" algn="l" defTabSz="914400" rtl="0" eaLnBrk="1" fontAlgn="auto" latinLnBrk="0" hangingPunct="1">
+              <a:lnSpc>
+                <a:spcPct val="90000"/>
+              </a:lnSpc>
+              <a:spcBef>
+                <a:spcPts val="1001"/>
+              </a:spcBef>
+              <a:spcAft>
+                <a:spcPts val="0"/>
+              </a:spcAft>
+              <a:buClr>
+                <a:srgbClr val="000000"/>
+              </a:buClr>
+              <a:buSzTx/>
+              <a:buFont typeface="Arial"/>
+              <a:buChar char="•"/>
+              <a:tabLst/>
+              <a:defRPr/>
+            </a:pPr>
+            <a:r>
+              <a:rPr kumimoji="0" lang="de-DE" sz="2800" b="0" i="0" u="none" strike="noStrike" kern="1200" cap="none" spc="-1" normalizeH="0" baseline="0" noProof="0">
+                <a:ln>
+                  <a:noFill/>
+                </a:ln>
+                <a:solidFill>
+                  <a:srgbClr val="000000"/>
+                </a:solidFill>
+                <a:effectLst/>
+                <a:uLnTx/>
+                <a:uFillTx/>
+                <a:latin typeface="Calibri"/>
+                <a:ea typeface="Microsoft YaHei"/>
+              </a:rPr>
+              <a:t>2700 cells, 32738 genes (→ dimension reduction, nonlinear)</a:t>
+            </a:r>
+            <a:endParaRPr kumimoji="0" lang="de-DE" sz="2800" b="0" i="0" u="none" strike="noStrike" kern="1200" cap="none" spc="-1" normalizeH="0" baseline="0" noProof="0">
+              <a:ln>
+                <a:noFill/>
+              </a:ln>
+              <a:solidFill>
+                <a:prstClr val="black"/>
+              </a:solidFill>
+              <a:effectLst/>
+              <a:uLnTx/>
+              <a:uFillTx/>
+              <a:latin typeface="Arial"/>
+            </a:endParaRPr>
+          </a:p>
+        </p:txBody>
+      </p:sp>
+    </p:spTree>
+  </p:cSld>
+  <p:clrMapOvr>
+    <a:masterClrMapping/>
+  </p:clrMapOvr>
+  <p:timing>
+    <p:tnLst>
+      <p:par>
+        <p:cTn id="1" dur="indefinite" restart="never" nodeType="tmRoot">
+          <p:childTnLst>
+            <p:seq>
+              <p:cTn id="2" dur="indefinite" nodeType="mainSeq">
+                <p:childTnLst>
+                  <p:par>
+                    <p:cTn id="3" fill="hold">
+                      <p:stCondLst>
+                        <p:cond delay="indefinite"/>
+                      </p:stCondLst>
+                      <p:childTnLst>
+                        <p:par>
+                          <p:cTn id="4" fill="hold">
+                            <p:stCondLst>
+                              <p:cond delay="0"/>
+                            </p:stCondLst>
+                            <p:childTnLst>
+                              <p:par>
+                                <p:cTn id="5" presetID="1" presetClass="entr" fill="hold" nodeType="clickEffect">
+                                  <p:stCondLst>
+                                    <p:cond delay="0"/>
+                                  </p:stCondLst>
+                                  <p:childTnLst>
+                                    <p:set>
+                                      <p:cBhvr>
+                                        <p:cTn id="6" dur="1" fill="hold">
+                                          <p:stCondLst>
+                                            <p:cond delay="0"/>
+                                          </p:stCondLst>
+                                        </p:cTn>
+                                        <p:tgtEl>
+                                          <p:spTgt spid="120">
+                                            <p:txEl>
+                                              <p:pRg st="0" end="0"/>
+                                            </p:txEl>
+                                          </p:spTgt>
+                                        </p:tgtEl>
+                                        <p:attrNameLst>
+                                          <p:attrName>style.visibility</p:attrName>
+                                        </p:attrNameLst>
+                                      </p:cBhvr>
+                                      <p:to>
+                                        <p:strVal val="visible"/>
+                                      </p:to>
+                                    </p:set>
+                                  </p:childTnLst>
+                                </p:cTn>
+                              </p:par>
+                            </p:childTnLst>
+                          </p:cTn>
+                        </p:par>
+                      </p:childTnLst>
+                    </p:cTn>
+                  </p:par>
+                </p:childTnLst>
+              </p:cTn>
+              <p:prevCondLst>
+                <p:cond evt="onPrev" delay="0">
+                  <p:tgtEl>
+                    <p:sldTgt/>
+                  </p:tgtEl>
+                </p:cond>
+              </p:prevCondLst>
+              <p:nextCondLst>
+                <p:cond evt="onNext" delay="0">
+                  <p:tgtEl>
+                    <p:sldTgt/>
+                  </p:tgtEl>
+                </p:cond>
+              </p:nextCondLst>
+            </p:seq>
+          </p:childTnLst>
+        </p:cTn>
+      </p:par>
+    </p:tnLst>
+  </p:timing>
+</p:sld>
+</file>
+
+<file path=ppt/slides/slide3.xml><?xml version="1.0" encoding="utf-8"?>
 <p:sld xmlns:a="http://schemas.openxmlformats.org/drawingml/2006/main" xmlns:r="http://schemas.openxmlformats.org/officeDocument/2006/relationships" xmlns:p="http://schemas.openxmlformats.org/presentationml/2006/main">
   <p:cSld>
     <p:spTree>
@@ -4530,7 +6986,7 @@
           <a:p>
             <a:fld id="{999F46FA-4938-441E-B37C-E27597AB75D6}" type="slidenum">
               <a:rPr lang="de-DE" smtClean="0"/>
-              <a:t>2</a:t>
+              <a:t>3</a:t>
             </a:fld>
             <a:endParaRPr lang="de-DE"/>
           </a:p>
@@ -4590,7 +7046,7 @@
 </p:sld>
 </file>
 
-<file path=ppt/slides/slide3.xml><?xml version="1.0" encoding="utf-8"?>
+<file path=ppt/slides/slide4.xml><?xml version="1.0" encoding="utf-8"?>
 <p:sld xmlns:a="http://schemas.openxmlformats.org/drawingml/2006/main" xmlns:r="http://schemas.openxmlformats.org/officeDocument/2006/relationships" xmlns:p="http://schemas.openxmlformats.org/presentationml/2006/main">
   <p:cSld>
     <p:spTree>
@@ -5684,8 +8140,8 @@
           </a:p>
         </p:txBody>
       </p:sp>
-      <mc:AlternateContent xmlns:mc="http://schemas.openxmlformats.org/markup-compatibility/2006">
-        <mc:Choice xmlns:pslz="http://schemas.microsoft.com/office/powerpoint/2016/slidezoom" Requires="pslz">
+      <mc:AlternateContent xmlns:mc="http://schemas.openxmlformats.org/markup-compatibility/2006" xmlns:pslz="http://schemas.microsoft.com/office/powerpoint/2016/slidezoom">
+        <mc:Choice Requires="pslz">
           <p:graphicFrame>
             <p:nvGraphicFramePr>
               <p:cNvPr id="9" name="Folienzoom 8">
@@ -5742,7 +8198,7 @@
             </a:graphic>
           </p:graphicFrame>
         </mc:Choice>
-        <mc:Fallback>
+        <mc:Fallback xmlns="">
           <p:pic>
             <p:nvPicPr>
               <p:cNvPr id="9" name="Folienzoom 8">
@@ -5759,7 +8215,7 @@
               <p:nvPr/>
             </p:nvPicPr>
             <p:blipFill>
-              <a:blip r:embed="rId2"/>
+              <a:blip r:embed="rId4"/>
               <a:stretch>
                 <a:fillRect/>
               </a:stretch>
@@ -5804,7 +8260,7 @@
           <a:p>
             <a:fld id="{999F46FA-4938-441E-B37C-E27597AB75D6}" type="slidenum">
               <a:rPr lang="de-DE" smtClean="0"/>
-              <a:t>3</a:t>
+              <a:t>4</a:t>
             </a:fld>
             <a:endParaRPr lang="de-DE"/>
           </a:p>
@@ -7069,7 +9525,7 @@
 </p:sld>
 </file>
 
-<file path=ppt/slides/slide4.xml><?xml version="1.0" encoding="utf-8"?>
+<file path=ppt/slides/slide5.xml><?xml version="1.0" encoding="utf-8"?>
 <p:sld xmlns:a="http://schemas.openxmlformats.org/drawingml/2006/main" xmlns:r="http://schemas.openxmlformats.org/officeDocument/2006/relationships" xmlns:p="http://schemas.openxmlformats.org/presentationml/2006/main">
   <p:cSld>
     <p:spTree>
@@ -7752,7 +10208,7 @@
           <a:p>
             <a:fld id="{999F46FA-4938-441E-B37C-E27597AB75D6}" type="slidenum">
               <a:rPr lang="de-DE" smtClean="0"/>
-              <a:t>4</a:t>
+              <a:t>5</a:t>
             </a:fld>
             <a:endParaRPr lang="de-DE"/>
           </a:p>
@@ -8023,7 +10479,7 @@
 </p:sld>
 </file>
 
-<file path=ppt/slides/slide5.xml><?xml version="1.0" encoding="utf-8"?>
+<file path=ppt/slides/slide6.xml><?xml version="1.0" encoding="utf-8"?>
 <p:sld xmlns:a="http://schemas.openxmlformats.org/drawingml/2006/main" xmlns:r="http://schemas.openxmlformats.org/officeDocument/2006/relationships" xmlns:p="http://schemas.openxmlformats.org/presentationml/2006/main">
   <p:cSld>
     <p:spTree>
@@ -12176,7 +14632,7 @@
           <a:p>
             <a:fld id="{999F46FA-4938-441E-B37C-E27597AB75D6}" type="slidenum">
               <a:rPr lang="de-DE" smtClean="0"/>
-              <a:t>5</a:t>
+              <a:t>6</a:t>
             </a:fld>
             <a:endParaRPr lang="de-DE"/>
           </a:p>
@@ -15995,7 +18451,7 @@
 </p:sld>
 </file>
 
-<file path=ppt/slides/slide6.xml><?xml version="1.0" encoding="utf-8"?>
+<file path=ppt/slides/slide7.xml><?xml version="1.0" encoding="utf-8"?>
 <p:sld xmlns:a="http://schemas.openxmlformats.org/drawingml/2006/main" xmlns:r="http://schemas.openxmlformats.org/officeDocument/2006/relationships" xmlns:p="http://schemas.openxmlformats.org/presentationml/2006/main">
   <p:cSld>
     <p:spTree>
@@ -16358,7 +18814,7 @@
           <a:p>
             <a:fld id="{999F46FA-4938-441E-B37C-E27597AB75D6}" type="slidenum">
               <a:rPr lang="de-DE" smtClean="0"/>
-              <a:t>6</a:t>
+              <a:t>7</a:t>
             </a:fld>
             <a:endParaRPr lang="de-DE"/>
           </a:p>
@@ -16557,7 +19013,7 @@
 </p:sld>
 </file>
 
-<file path=ppt/slides/slide7.xml><?xml version="1.0" encoding="utf-8"?>
+<file path=ppt/slides/slide8.xml><?xml version="1.0" encoding="utf-8"?>
 <p:sld xmlns:a="http://schemas.openxmlformats.org/drawingml/2006/main" xmlns:r="http://schemas.openxmlformats.org/officeDocument/2006/relationships" xmlns:p="http://schemas.openxmlformats.org/presentationml/2006/main">
   <p:cSld>
     <p:spTree>
@@ -16715,7 +19171,7 @@
           <a:p>
             <a:fld id="{999F46FA-4938-441E-B37C-E27597AB75D6}" type="slidenum">
               <a:rPr lang="de-DE" smtClean="0"/>
-              <a:t>7</a:t>
+              <a:t>8</a:t>
             </a:fld>
             <a:endParaRPr lang="de-DE"/>
           </a:p>
@@ -16775,7 +19231,7 @@
 </p:sld>
 </file>
 
-<file path=ppt/slides/slide8.xml><?xml version="1.0" encoding="utf-8"?>
+<file path=ppt/slides/slide9.xml><?xml version="1.0" encoding="utf-8"?>
 <p:sld xmlns:a="http://schemas.openxmlformats.org/drawingml/2006/main" xmlns:r="http://schemas.openxmlformats.org/officeDocument/2006/relationships" xmlns:p="http://schemas.openxmlformats.org/presentationml/2006/main">
   <p:cSld>
     <p:spTree>
@@ -17361,7 +19817,7 @@
           <a:p>
             <a:fld id="{999F46FA-4938-441E-B37C-E27597AB75D6}" type="slidenum">
               <a:rPr lang="de-DE" smtClean="0"/>
-              <a:t>8</a:t>
+              <a:t>9</a:t>
             </a:fld>
             <a:endParaRPr lang="de-DE"/>
           </a:p>
@@ -17933,6 +20389,231 @@
 </file>
 
 <file path=ppt/theme/theme2.xml><?xml version="1.0" encoding="utf-8"?>
+<a:theme xmlns:a="http://schemas.openxmlformats.org/drawingml/2006/main" name="Office Theme">
+  <a:themeElements>
+    <a:clrScheme name="Office">
+      <a:dk1>
+        <a:sysClr val="windowText" lastClr="000000"/>
+      </a:dk1>
+      <a:lt1>
+        <a:sysClr val="window" lastClr="FFFFFF"/>
+      </a:lt1>
+      <a:dk2>
+        <a:srgbClr val="1F497D"/>
+      </a:dk2>
+      <a:lt2>
+        <a:srgbClr val="EEECE1"/>
+      </a:lt2>
+      <a:accent1>
+        <a:srgbClr val="4F81BD"/>
+      </a:accent1>
+      <a:accent2>
+        <a:srgbClr val="C0504D"/>
+      </a:accent2>
+      <a:accent3>
+        <a:srgbClr val="9BBB59"/>
+      </a:accent3>
+      <a:accent4>
+        <a:srgbClr val="8064A2"/>
+      </a:accent4>
+      <a:accent5>
+        <a:srgbClr val="4BACC6"/>
+      </a:accent5>
+      <a:accent6>
+        <a:srgbClr val="F79646"/>
+      </a:accent6>
+      <a:hlink>
+        <a:srgbClr val="0000FF"/>
+      </a:hlink>
+      <a:folHlink>
+        <a:srgbClr val="800080"/>
+      </a:folHlink>
+    </a:clrScheme>
+    <a:fontScheme name="Office">
+      <a:majorFont>
+        <a:latin typeface="Arial"/>
+        <a:ea typeface="DejaVu Sans"/>
+        <a:cs typeface="DejaVu Sans"/>
+      </a:majorFont>
+      <a:minorFont>
+        <a:latin typeface="Arial"/>
+        <a:ea typeface="DejaVu Sans"/>
+        <a:cs typeface="DejaVu Sans"/>
+      </a:minorFont>
+    </a:fontScheme>
+    <a:fmtScheme name="Office">
+      <a:fillStyleLst>
+        <a:solidFill>
+          <a:schemeClr val="phClr"/>
+        </a:solidFill>
+        <a:gradFill rotWithShape="1">
+          <a:gsLst>
+            <a:gs pos="0">
+              <a:schemeClr val="phClr">
+                <a:tint val="50000"/>
+                <a:satMod val="300000"/>
+              </a:schemeClr>
+            </a:gs>
+            <a:gs pos="35000">
+              <a:schemeClr val="phClr">
+                <a:tint val="37000"/>
+                <a:satMod val="300000"/>
+              </a:schemeClr>
+            </a:gs>
+            <a:gs pos="100000">
+              <a:schemeClr val="phClr">
+                <a:tint val="15000"/>
+                <a:satMod val="350000"/>
+              </a:schemeClr>
+            </a:gs>
+          </a:gsLst>
+          <a:lin ang="16200000" scaled="1"/>
+        </a:gradFill>
+        <a:gradFill rotWithShape="1">
+          <a:gsLst>
+            <a:gs pos="0">
+              <a:schemeClr val="phClr">
+                <a:shade val="51000"/>
+                <a:satMod val="130000"/>
+              </a:schemeClr>
+            </a:gs>
+            <a:gs pos="80000">
+              <a:schemeClr val="phClr">
+                <a:shade val="93000"/>
+                <a:satMod val="130000"/>
+              </a:schemeClr>
+            </a:gs>
+            <a:gs pos="100000">
+              <a:schemeClr val="phClr">
+                <a:shade val="94000"/>
+                <a:satMod val="135000"/>
+              </a:schemeClr>
+            </a:gs>
+          </a:gsLst>
+          <a:lin ang="16200000" scaled="0"/>
+        </a:gradFill>
+      </a:fillStyleLst>
+      <a:lnStyleLst>
+        <a:ln w="9525" cap="flat" cmpd="sng" algn="ctr">
+          <a:solidFill>
+            <a:schemeClr val="phClr">
+              <a:shade val="95000"/>
+              <a:satMod val="105000"/>
+            </a:schemeClr>
+          </a:solidFill>
+          <a:prstDash val="solid"/>
+        </a:ln>
+        <a:ln w="25400" cap="flat" cmpd="sng" algn="ctr">
+          <a:solidFill>
+            <a:schemeClr val="phClr"/>
+          </a:solidFill>
+          <a:prstDash val="solid"/>
+        </a:ln>
+        <a:ln w="38100" cap="flat" cmpd="sng" algn="ctr">
+          <a:solidFill>
+            <a:schemeClr val="phClr"/>
+          </a:solidFill>
+          <a:prstDash val="solid"/>
+        </a:ln>
+      </a:lnStyleLst>
+      <a:effectStyleLst>
+        <a:effectStyle>
+          <a:effectLst>
+            <a:outerShdw blurRad="40000" dist="20000" dir="5400000" rotWithShape="0">
+              <a:srgbClr val="000000">
+                <a:alpha val="38000"/>
+              </a:srgbClr>
+            </a:outerShdw>
+          </a:effectLst>
+        </a:effectStyle>
+        <a:effectStyle>
+          <a:effectLst>
+            <a:outerShdw blurRad="40000" dist="23000" dir="5400000" rotWithShape="0">
+              <a:srgbClr val="000000">
+                <a:alpha val="35000"/>
+              </a:srgbClr>
+            </a:outerShdw>
+          </a:effectLst>
+        </a:effectStyle>
+        <a:effectStyle>
+          <a:effectLst>
+            <a:outerShdw blurRad="40000" dist="23000" dir="5400000" rotWithShape="0">
+              <a:srgbClr val="000000">
+                <a:alpha val="35000"/>
+              </a:srgbClr>
+            </a:outerShdw>
+          </a:effectLst>
+          <a:scene3d>
+            <a:camera prst="orthographicFront">
+              <a:rot lat="0" lon="0" rev="0"/>
+            </a:camera>
+            <a:lightRig rig="threePt" dir="t">
+              <a:rot lat="0" lon="0" rev="1200000"/>
+            </a:lightRig>
+          </a:scene3d>
+          <a:sp3d>
+            <a:bevelT w="63500" h="25400"/>
+          </a:sp3d>
+        </a:effectStyle>
+      </a:effectStyleLst>
+      <a:bgFillStyleLst>
+        <a:solidFill>
+          <a:schemeClr val="phClr"/>
+        </a:solidFill>
+        <a:gradFill rotWithShape="1">
+          <a:gsLst>
+            <a:gs pos="0">
+              <a:schemeClr val="phClr">
+                <a:tint val="40000"/>
+                <a:satMod val="350000"/>
+              </a:schemeClr>
+            </a:gs>
+            <a:gs pos="40000">
+              <a:schemeClr val="phClr">
+                <a:tint val="45000"/>
+                <a:shade val="99000"/>
+                <a:satMod val="350000"/>
+              </a:schemeClr>
+            </a:gs>
+            <a:gs pos="100000">
+              <a:schemeClr val="phClr">
+                <a:shade val="20000"/>
+                <a:satMod val="255000"/>
+              </a:schemeClr>
+            </a:gs>
+          </a:gsLst>
+          <a:path path="circle">
+            <a:fillToRect l="50000" t="-80000" r="50000" b="180000"/>
+          </a:path>
+        </a:gradFill>
+        <a:gradFill rotWithShape="1">
+          <a:gsLst>
+            <a:gs pos="0">
+              <a:schemeClr val="phClr">
+                <a:tint val="80000"/>
+                <a:satMod val="300000"/>
+              </a:schemeClr>
+            </a:gs>
+            <a:gs pos="100000">
+              <a:schemeClr val="phClr">
+                <a:shade val="30000"/>
+                <a:satMod val="200000"/>
+              </a:schemeClr>
+            </a:gs>
+          </a:gsLst>
+          <a:path path="circle">
+            <a:fillToRect l="50000" t="50000" r="50000" b="50000"/>
+          </a:path>
+        </a:gradFill>
+      </a:bgFillStyleLst>
+    </a:fmtScheme>
+  </a:themeElements>
+  <a:objectDefaults/>
+  <a:extraClrSchemeLst/>
+</a:theme>
+</file>
+
+<file path=ppt/theme/theme3.xml><?xml version="1.0" encoding="utf-8"?>
 <a:theme xmlns:a="http://schemas.openxmlformats.org/drawingml/2006/main" name="Office">
   <a:themeElements>
     <a:clrScheme name="Office">

</xml_diff>